<commit_message>
Upd pptx presentation w/alternative use-case diagram
</commit_message>
<xml_diff>
--- a/Preliminary Presentation.pptx
+++ b/Preliminary Presentation.pptx
@@ -5,7 +5,7 @@
     <p:sldMasterId id="2147483648" r:id="rId1"/>
   </p:sldMasterIdLst>
   <p:notesMasterIdLst>
-    <p:notesMasterId r:id="rId11"/>
+    <p:notesMasterId r:id="rId10"/>
   </p:notesMasterIdLst>
   <p:sldIdLst>
     <p:sldId id="256" r:id="rId2"/>
@@ -14,9 +14,8 @@
     <p:sldId id="258" r:id="rId5"/>
     <p:sldId id="259" r:id="rId6"/>
     <p:sldId id="260" r:id="rId7"/>
-    <p:sldId id="261" r:id="rId8"/>
-    <p:sldId id="262" r:id="rId9"/>
-    <p:sldId id="264" r:id="rId10"/>
+    <p:sldId id="262" r:id="rId8"/>
+    <p:sldId id="264" r:id="rId9"/>
   </p:sldIdLst>
   <p:sldSz cx="9144000" cy="6858000" type="screen4x3"/>
   <p:notesSz cx="6858000" cy="9144000"/>
@@ -137,53 +136,10 @@
 <file path=ppt/revisionInfo.xml><?xml version="1.0" encoding="utf-8"?>
 <p1510:revInfo xmlns:a="http://schemas.openxmlformats.org/drawingml/2006/main" xmlns:r="http://schemas.openxmlformats.org/officeDocument/2006/relationships" xmlns:p1510="http://schemas.microsoft.com/office/powerpoint/2015/10/main">
   <p1510:revLst>
-    <p1510:client id="{51DA83A5-9DAC-2E4E-98CB-0F60CD469263}" v="1" dt="2020-11-23T10:47:53.953"/>
+    <p1510:client id="{7E813D99-AEB3-4B76-BDCC-DFF4C8F531E4}" v="1260" dt="2023-12-10T16:23:33.526"/>
+    <p1510:client id="{C0DCF464-8A71-49F3-B299-0498C9951E1E}" v="233" dt="2023-12-10T17:09:33.963"/>
   </p1510:revLst>
 </p1510:revInfo>
-</file>
-
-<file path=ppt/changesInfos/changesInfo1.xml><?xml version="1.0" encoding="utf-8"?>
-<pc:chgInfo xmlns:a="http://schemas.openxmlformats.org/drawingml/2006/main" xmlns:r="http://schemas.openxmlformats.org/officeDocument/2006/relationships" xmlns:ac="http://schemas.microsoft.com/office/drawing/2013/main/command" xmlns:pc="http://schemas.microsoft.com/office/powerpoint/2013/main/command">
-  <pc:docChgLst>
-    <pc:chgData name="Pietro Ducange" userId="3881275a-5346-4624-88aa-cc4682e089e6" providerId="ADAL" clId="{51DA83A5-9DAC-2E4E-98CB-0F60CD469263}"/>
-    <pc:docChg chg="modSld">
-      <pc:chgData name="Pietro Ducange" userId="3881275a-5346-4624-88aa-cc4682e089e6" providerId="ADAL" clId="{51DA83A5-9DAC-2E4E-98CB-0F60CD469263}" dt="2020-11-23T15:19:35.337" v="73" actId="14100"/>
-      <pc:docMkLst>
-        <pc:docMk/>
-      </pc:docMkLst>
-      <pc:sldChg chg="modSp mod">
-        <pc:chgData name="Pietro Ducange" userId="3881275a-5346-4624-88aa-cc4682e089e6" providerId="ADAL" clId="{51DA83A5-9DAC-2E4E-98CB-0F60CD469263}" dt="2020-11-23T15:19:35.337" v="73" actId="14100"/>
-        <pc:sldMkLst>
-          <pc:docMk/>
-          <pc:sldMk cId="1621469791" sldId="256"/>
-        </pc:sldMkLst>
-        <pc:spChg chg="mod">
-          <ac:chgData name="Pietro Ducange" userId="3881275a-5346-4624-88aa-cc4682e089e6" providerId="ADAL" clId="{51DA83A5-9DAC-2E4E-98CB-0F60CD469263}" dt="2020-11-23T15:19:35.337" v="73" actId="14100"/>
-          <ac:spMkLst>
-            <pc:docMk/>
-            <pc:sldMk cId="1621469791" sldId="256"/>
-            <ac:spMk id="2" creationId="{00000000-0000-0000-0000-000000000000}"/>
-          </ac:spMkLst>
-        </pc:spChg>
-      </pc:sldChg>
-      <pc:sldChg chg="addSp modSp mod">
-        <pc:chgData name="Pietro Ducange" userId="3881275a-5346-4624-88aa-cc4682e089e6" providerId="ADAL" clId="{51DA83A5-9DAC-2E4E-98CB-0F60CD469263}" dt="2020-11-23T10:48:14.343" v="71" actId="20577"/>
-        <pc:sldMkLst>
-          <pc:docMk/>
-          <pc:sldMk cId="710998634" sldId="263"/>
-        </pc:sldMkLst>
-        <pc:spChg chg="add mod">
-          <ac:chgData name="Pietro Ducange" userId="3881275a-5346-4624-88aa-cc4682e089e6" providerId="ADAL" clId="{51DA83A5-9DAC-2E4E-98CB-0F60CD469263}" dt="2020-11-23T10:48:14.343" v="71" actId="20577"/>
-          <ac:spMkLst>
-            <pc:docMk/>
-            <pc:sldMk cId="710998634" sldId="263"/>
-            <ac:spMk id="3" creationId="{391F4034-971B-8A4B-888B-5902E8333D6B}"/>
-          </ac:spMkLst>
-        </pc:spChg>
-      </pc:sldChg>
-    </pc:docChg>
-  </pc:docChgLst>
-</pc:chgInfo>
 </file>
 
 <file path=ppt/notesMasters/notesMaster1.xml><?xml version="1.0" encoding="utf-8"?>
@@ -268,7 +224,7 @@
           <a:p>
             <a:fld id="{0EF95162-6873-F647-B392-BF6A1F606277}" type="datetimeFigureOut">
               <a:rPr lang="it-IT" smtClean="0"/>
-              <a:t>23/11/20</a:t>
+              <a:t>10/12/2023</a:t>
             </a:fld>
             <a:endParaRPr lang="it-IT"/>
           </a:p>
@@ -722,7 +678,7 @@
           <a:p>
             <a:fld id="{2FDCBEE4-315A-8E42-835E-29A1DAE07625}" type="datetimeFigureOut">
               <a:rPr lang="it-IT" smtClean="0"/>
-              <a:t>23/11/20</a:t>
+              <a:t>10/12/2023</a:t>
             </a:fld>
             <a:endParaRPr lang="it-IT"/>
           </a:p>
@@ -914,7 +870,7 @@
           <a:p>
             <a:fld id="{2FDCBEE4-315A-8E42-835E-29A1DAE07625}" type="datetimeFigureOut">
               <a:rPr lang="it-IT" smtClean="0"/>
-              <a:t>23/11/20</a:t>
+              <a:t>10/12/2023</a:t>
             </a:fld>
             <a:endParaRPr lang="it-IT"/>
           </a:p>
@@ -1116,7 +1072,7 @@
           <a:p>
             <a:fld id="{2FDCBEE4-315A-8E42-835E-29A1DAE07625}" type="datetimeFigureOut">
               <a:rPr lang="it-IT" smtClean="0"/>
-              <a:t>23/11/20</a:t>
+              <a:t>10/12/2023</a:t>
             </a:fld>
             <a:endParaRPr lang="it-IT"/>
           </a:p>
@@ -1308,7 +1264,7 @@
           <a:p>
             <a:fld id="{2FDCBEE4-315A-8E42-835E-29A1DAE07625}" type="datetimeFigureOut">
               <a:rPr lang="it-IT" smtClean="0"/>
-              <a:t>23/11/20</a:t>
+              <a:t>10/12/2023</a:t>
             </a:fld>
             <a:endParaRPr lang="it-IT"/>
           </a:p>
@@ -1577,7 +1533,7 @@
           <a:p>
             <a:fld id="{2FDCBEE4-315A-8E42-835E-29A1DAE07625}" type="datetimeFigureOut">
               <a:rPr lang="it-IT" smtClean="0"/>
-              <a:t>23/11/20</a:t>
+              <a:t>10/12/2023</a:t>
             </a:fld>
             <a:endParaRPr lang="it-IT"/>
           </a:p>
@@ -1886,7 +1842,7 @@
           <a:p>
             <a:fld id="{2FDCBEE4-315A-8E42-835E-29A1DAE07625}" type="datetimeFigureOut">
               <a:rPr lang="it-IT" smtClean="0"/>
-              <a:t>23/11/20</a:t>
+              <a:t>10/12/2023</a:t>
             </a:fld>
             <a:endParaRPr lang="it-IT"/>
           </a:p>
@@ -2329,7 +2285,7 @@
           <a:p>
             <a:fld id="{2FDCBEE4-315A-8E42-835E-29A1DAE07625}" type="datetimeFigureOut">
               <a:rPr lang="it-IT" smtClean="0"/>
-              <a:t>23/11/20</a:t>
+              <a:t>10/12/2023</a:t>
             </a:fld>
             <a:endParaRPr lang="it-IT"/>
           </a:p>
@@ -2470,7 +2426,7 @@
           <a:p>
             <a:fld id="{2FDCBEE4-315A-8E42-835E-29A1DAE07625}" type="datetimeFigureOut">
               <a:rPr lang="it-IT" smtClean="0"/>
-              <a:t>23/11/20</a:t>
+              <a:t>10/12/2023</a:t>
             </a:fld>
             <a:endParaRPr lang="it-IT"/>
           </a:p>
@@ -2589,7 +2545,7 @@
           <a:p>
             <a:fld id="{2FDCBEE4-315A-8E42-835E-29A1DAE07625}" type="datetimeFigureOut">
               <a:rPr lang="it-IT" smtClean="0"/>
-              <a:t>23/11/20</a:t>
+              <a:t>10/12/2023</a:t>
             </a:fld>
             <a:endParaRPr lang="it-IT"/>
           </a:p>
@@ -2888,7 +2844,7 @@
           <a:p>
             <a:fld id="{2FDCBEE4-315A-8E42-835E-29A1DAE07625}" type="datetimeFigureOut">
               <a:rPr lang="it-IT" smtClean="0"/>
-              <a:t>23/11/20</a:t>
+              <a:t>10/12/2023</a:t>
             </a:fld>
             <a:endParaRPr lang="it-IT"/>
           </a:p>
@@ -3164,7 +3120,7 @@
           <a:p>
             <a:fld id="{2FDCBEE4-315A-8E42-835E-29A1DAE07625}" type="datetimeFigureOut">
               <a:rPr lang="it-IT" smtClean="0"/>
-              <a:t>23/11/20</a:t>
+              <a:t>10/12/2023</a:t>
             </a:fld>
             <a:endParaRPr lang="it-IT"/>
           </a:p>
@@ -3289,23 +3245,23 @@
           <a:lstStyle/>
           <a:p>
             <a:r>
-              <a:rPr lang="en-US" noProof="0" dirty="0"/>
+              <a:rPr lang="en-US" noProof="0"/>
               <a:t>Fare </a:t>
             </a:r>
             <a:r>
-              <a:rPr lang="en-US" noProof="0" dirty="0" err="1"/>
+              <a:rPr lang="en-US" noProof="0" err="1"/>
               <a:t>clic</a:t>
             </a:r>
             <a:r>
-              <a:rPr lang="en-US" noProof="0" dirty="0"/>
+              <a:rPr lang="en-US" noProof="0"/>
               <a:t> per </a:t>
             </a:r>
             <a:r>
-              <a:rPr lang="en-US" noProof="0" dirty="0" err="1"/>
+              <a:rPr lang="en-US" noProof="0" err="1"/>
               <a:t>modificare</a:t>
             </a:r>
             <a:r>
-              <a:rPr lang="en-US" noProof="0" dirty="0"/>
+              <a:rPr lang="en-US" noProof="0"/>
               <a:t> stile</a:t>
             </a:r>
           </a:p>
@@ -3338,113 +3294,113 @@
           <a:p>
             <a:pPr lvl="0"/>
             <a:r>
-              <a:rPr lang="en-US" noProof="0" dirty="0"/>
+              <a:rPr lang="en-US" noProof="0"/>
               <a:t>Fare </a:t>
             </a:r>
             <a:r>
-              <a:rPr lang="en-US" noProof="0" dirty="0" err="1"/>
+              <a:rPr lang="en-US" noProof="0" err="1"/>
               <a:t>clic</a:t>
             </a:r>
             <a:r>
-              <a:rPr lang="en-US" noProof="0" dirty="0"/>
+              <a:rPr lang="en-US" noProof="0"/>
               <a:t> per </a:t>
             </a:r>
             <a:r>
-              <a:rPr lang="en-US" noProof="0" dirty="0" err="1"/>
+              <a:rPr lang="en-US" noProof="0" err="1"/>
               <a:t>modificare</a:t>
             </a:r>
             <a:r>
-              <a:rPr lang="en-US" noProof="0" dirty="0"/>
+              <a:rPr lang="en-US" noProof="0"/>
               <a:t> </a:t>
             </a:r>
             <a:r>
-              <a:rPr lang="en-US" noProof="0" dirty="0" err="1"/>
+              <a:rPr lang="en-US" noProof="0" err="1"/>
               <a:t>gli</a:t>
             </a:r>
             <a:r>
-              <a:rPr lang="en-US" noProof="0" dirty="0"/>
+              <a:rPr lang="en-US" noProof="0"/>
               <a:t> </a:t>
             </a:r>
             <a:r>
-              <a:rPr lang="en-US" noProof="0" dirty="0" err="1"/>
+              <a:rPr lang="en-US" noProof="0" err="1"/>
               <a:t>stili</a:t>
             </a:r>
             <a:r>
-              <a:rPr lang="en-US" noProof="0" dirty="0"/>
+              <a:rPr lang="en-US" noProof="0"/>
               <a:t> del </a:t>
             </a:r>
             <a:r>
-              <a:rPr lang="en-US" noProof="0" dirty="0" err="1"/>
+              <a:rPr lang="en-US" noProof="0" err="1"/>
               <a:t>testo</a:t>
             </a:r>
             <a:r>
-              <a:rPr lang="en-US" noProof="0" dirty="0"/>
+              <a:rPr lang="en-US" noProof="0"/>
               <a:t> </a:t>
             </a:r>
             <a:r>
-              <a:rPr lang="en-US" noProof="0" dirty="0" err="1"/>
+              <a:rPr lang="en-US" noProof="0" err="1"/>
               <a:t>dello</a:t>
             </a:r>
             <a:r>
-              <a:rPr lang="en-US" noProof="0" dirty="0"/>
+              <a:rPr lang="en-US" noProof="0"/>
               <a:t> schema</a:t>
             </a:r>
           </a:p>
           <a:p>
             <a:pPr lvl="1"/>
             <a:r>
-              <a:rPr lang="en-US" noProof="0" dirty="0"/>
+              <a:rPr lang="en-US" noProof="0"/>
               <a:t>Secondo </a:t>
             </a:r>
             <a:r>
-              <a:rPr lang="en-US" noProof="0" dirty="0" err="1"/>
+              <a:rPr lang="en-US" noProof="0" err="1"/>
               <a:t>livello</a:t>
             </a:r>
-            <a:endParaRPr lang="en-US" noProof="0" dirty="0"/>
+            <a:endParaRPr lang="en-US" noProof="0"/>
           </a:p>
           <a:p>
             <a:pPr lvl="2"/>
             <a:r>
-              <a:rPr lang="en-US" noProof="0" dirty="0" err="1"/>
+              <a:rPr lang="en-US" noProof="0" err="1"/>
               <a:t>Terzo</a:t>
             </a:r>
             <a:r>
-              <a:rPr lang="en-US" noProof="0" dirty="0"/>
+              <a:rPr lang="en-US" noProof="0"/>
               <a:t> </a:t>
             </a:r>
             <a:r>
-              <a:rPr lang="en-US" noProof="0" dirty="0" err="1"/>
+              <a:rPr lang="en-US" noProof="0" err="1"/>
               <a:t>livello</a:t>
             </a:r>
-            <a:endParaRPr lang="en-US" noProof="0" dirty="0"/>
+            <a:endParaRPr lang="en-US" noProof="0"/>
           </a:p>
           <a:p>
             <a:pPr lvl="3"/>
             <a:r>
-              <a:rPr lang="en-US" noProof="0" dirty="0"/>
+              <a:rPr lang="en-US" noProof="0"/>
               <a:t>Quarto </a:t>
             </a:r>
             <a:r>
-              <a:rPr lang="en-US" noProof="0" dirty="0" err="1"/>
+              <a:rPr lang="en-US" noProof="0" err="1"/>
               <a:t>livello</a:t>
             </a:r>
-            <a:endParaRPr lang="en-US" noProof="0" dirty="0"/>
+            <a:endParaRPr lang="en-US" noProof="0"/>
           </a:p>
           <a:p>
             <a:pPr lvl="4"/>
             <a:r>
-              <a:rPr lang="en-US" noProof="0" dirty="0" err="1"/>
+              <a:rPr lang="en-US" noProof="0" err="1"/>
               <a:t>Quinto</a:t>
             </a:r>
             <a:r>
-              <a:rPr lang="en-US" noProof="0" dirty="0"/>
+              <a:rPr lang="en-US" noProof="0"/>
               <a:t> </a:t>
             </a:r>
             <a:r>
-              <a:rPr lang="en-US" noProof="0" dirty="0" err="1"/>
+              <a:rPr lang="en-US" noProof="0" err="1"/>
               <a:t>livello</a:t>
             </a:r>
-            <a:endParaRPr lang="en-US" noProof="0" dirty="0"/>
+            <a:endParaRPr lang="en-US" noProof="0"/>
           </a:p>
         </p:txBody>
       </p:sp>
@@ -3852,24 +3808,24 @@
           <a:lstStyle/>
           <a:p>
             <a:r>
-              <a:rPr lang="en-US" sz="3900" dirty="0"/>
+              <a:rPr lang="en-US" sz="3900"/>
               <a:t>Large-Scale and Multi-Structured Databases</a:t>
             </a:r>
             <a:br>
-              <a:rPr lang="en-US" dirty="0"/>
+              <a:rPr lang="en-US"/>
             </a:br>
             <a:r>
-              <a:rPr lang="en-US" b="1" i="1" dirty="0"/>
+              <a:rPr lang="en-US" b="1" i="1"/>
               <a:t>Project Design</a:t>
             </a:r>
             <a:br>
-              <a:rPr lang="en-US" b="1" i="1" dirty="0"/>
+              <a:rPr lang="en-US" b="1" i="1"/>
             </a:br>
             <a:r>
-              <a:rPr lang="en-US" b="1" i="1" dirty="0"/>
-              <a:t>&lt;title&gt;</a:t>
-            </a:r>
-            <a:endParaRPr lang="en-US" sz="3300" i="1" dirty="0"/>
+              <a:rPr lang="en-US" b="1" i="1" err="1"/>
+              <a:t>PixelIndex</a:t>
+            </a:r>
+            <a:endParaRPr lang="en-US" sz="3300" i="1"/>
           </a:p>
         </p:txBody>
       </p:sp>
@@ -3889,16 +3845,20 @@
           <a:lstStyle/>
           <a:p>
             <a:r>
-              <a:rPr lang="it-IT" dirty="0"/>
-              <a:t>&lt;</a:t>
-            </a:r>
-            <a:r>
-              <a:rPr lang="it-IT" dirty="0" err="1"/>
-              <a:t>authors</a:t>
-            </a:r>
-            <a:r>
-              <a:rPr lang="it-IT" dirty="0"/>
-              <a:t>&gt;</a:t>
+              <a:rPr lang="it-IT"/>
+              <a:t>Ceccanti Lorenzo</a:t>
+            </a:r>
+          </a:p>
+          <a:p>
+            <a:r>
+              <a:rPr lang="it-IT"/>
+              <a:t>Corsi Cristiano</a:t>
+            </a:r>
+          </a:p>
+          <a:p>
+            <a:r>
+              <a:rPr lang="it-IT"/>
+              <a:t>Mulé Niccolò</a:t>
             </a:r>
           </a:p>
         </p:txBody>
@@ -3955,7 +3915,7 @@
           <a:lstStyle/>
           <a:p>
             <a:r>
-              <a:rPr lang="en-US" dirty="0"/>
+              <a:rPr lang="en-US"/>
               <a:t>Application Highlights</a:t>
             </a:r>
           </a:p>
@@ -3975,8 +3935,8 @@
         </p:nvSpPr>
         <p:spPr>
           <a:xfrm>
-            <a:off x="424543" y="1404256"/>
-            <a:ext cx="8343900" cy="1477328"/>
+            <a:off x="391689" y="1289956"/>
+            <a:ext cx="8343900" cy="4524315"/>
           </a:xfrm>
           <a:prstGeom prst="rect">
             <a:avLst/>
@@ -3989,29 +3949,138 @@
           </a:bodyPr>
           <a:lstStyle/>
           <a:p>
-            <a:r>
-              <a:rPr lang="en-US" i="1" dirty="0"/>
-              <a:t>Give a snapshot of the main features of the proposed application. </a:t>
-            </a:r>
-          </a:p>
-          <a:p>
-            <a:endParaRPr lang="en-US" i="1" dirty="0"/>
-          </a:p>
-          <a:p>
-            <a:r>
-              <a:rPr lang="en-US" i="1" dirty="0"/>
-              <a:t>Adopt a bullet list</a:t>
-            </a:r>
-          </a:p>
-          <a:p>
-            <a:endParaRPr lang="en-US" dirty="0"/>
+            <a:pPr>
+              <a:lnSpc>
+                <a:spcPct val="150000"/>
+              </a:lnSpc>
+            </a:pPr>
+            <a:r>
+              <a:rPr lang="en-US"/>
+              <a:t>The application is useful for:</a:t>
+            </a:r>
           </a:p>
           <a:p>
             <a:pPr marL="285750" indent="-285750">
+              <a:lnSpc>
+                <a:spcPct val="150000"/>
+              </a:lnSpc>
               <a:buFont typeface="Arial" panose="020B0604020202020204" pitchFamily="34" charset="0"/>
               <a:buChar char="•"/>
             </a:pPr>
-            <a:endParaRPr lang="en-US" dirty="0"/>
+            <a:r>
+              <a:rPr lang="en-US" b="1"/>
+              <a:t>Manage your game collection</a:t>
+            </a:r>
+            <a:r>
+              <a:rPr lang="en-US"/>
+              <a:t>:</a:t>
+            </a:r>
+          </a:p>
+          <a:p>
+            <a:pPr marL="742950" lvl="1" indent="-285750">
+              <a:lnSpc>
+                <a:spcPct val="150000"/>
+              </a:lnSpc>
+              <a:buFont typeface="Arial" panose="020B0604020202020204" pitchFamily="34" charset="0"/>
+              <a:buChar char="•"/>
+            </a:pPr>
+            <a:r>
+              <a:rPr lang="en-US"/>
+              <a:t>Keeping track of your videogame library and add new games with ease</a:t>
+            </a:r>
+          </a:p>
+          <a:p>
+            <a:pPr marL="285750" indent="-285750">
+              <a:lnSpc>
+                <a:spcPct val="150000"/>
+              </a:lnSpc>
+              <a:buFont typeface="Arial" panose="020B0604020202020204" pitchFamily="34" charset="0"/>
+              <a:buChar char="•"/>
+            </a:pPr>
+            <a:r>
+              <a:rPr lang="en-US" b="1"/>
+              <a:t>Wishlist</a:t>
+            </a:r>
+            <a:r>
+              <a:rPr lang="en-US"/>
+              <a:t>:</a:t>
+            </a:r>
+          </a:p>
+          <a:p>
+            <a:pPr marL="742950" lvl="1" indent="-285750">
+              <a:lnSpc>
+                <a:spcPct val="150000"/>
+              </a:lnSpc>
+              <a:buFont typeface="Arial" panose="020B0604020202020204" pitchFamily="34" charset="0"/>
+              <a:buChar char="•"/>
+            </a:pPr>
+            <a:r>
+              <a:rPr lang="en-US"/>
+              <a:t>Add games to your wishlist to keep track to the titles you want to play next filtering by platform, genre or release date</a:t>
+            </a:r>
+          </a:p>
+          <a:p>
+            <a:pPr marL="285750" indent="-285750">
+              <a:lnSpc>
+                <a:spcPct val="150000"/>
+              </a:lnSpc>
+              <a:buFont typeface="Arial" panose="020B0604020202020204" pitchFamily="34" charset="0"/>
+              <a:buChar char="•"/>
+            </a:pPr>
+            <a:r>
+              <a:rPr lang="en-US" b="1"/>
+              <a:t>Hall of fame</a:t>
+            </a:r>
+            <a:r>
+              <a:rPr lang="en-US"/>
+              <a:t>:</a:t>
+            </a:r>
+          </a:p>
+          <a:p>
+            <a:pPr marL="742950" lvl="1" indent="-285750">
+              <a:lnSpc>
+                <a:spcPct val="150000"/>
+              </a:lnSpc>
+              <a:buFont typeface="Arial" panose="020B0604020202020204" pitchFamily="34" charset="0"/>
+              <a:buChar char="•"/>
+            </a:pPr>
+            <a:r>
+              <a:rPr lang="en-US"/>
+              <a:t>Track your trophies and achievements</a:t>
+            </a:r>
+          </a:p>
+          <a:p>
+            <a:pPr marL="285750" indent="-285750">
+              <a:lnSpc>
+                <a:spcPct val="150000"/>
+              </a:lnSpc>
+              <a:buFont typeface="Arial" panose="020B0604020202020204" pitchFamily="34" charset="0"/>
+              <a:buChar char="•"/>
+            </a:pPr>
+            <a:r>
+              <a:rPr lang="en-US" b="1"/>
+              <a:t>Join the gaming community</a:t>
+            </a:r>
+            <a:r>
+              <a:rPr lang="en-US"/>
+              <a:t>:</a:t>
+            </a:r>
+          </a:p>
+          <a:p>
+            <a:pPr marL="742950" lvl="1" indent="-285750">
+              <a:lnSpc>
+                <a:spcPct val="150000"/>
+              </a:lnSpc>
+              <a:buFont typeface="Arial" panose="020B0604020202020204" pitchFamily="34" charset="0"/>
+              <a:buChar char="•"/>
+            </a:pPr>
+            <a:r>
+              <a:rPr lang="en-US"/>
+              <a:t>Connect with other players, share rating and reviews and follow their activities</a:t>
+            </a:r>
+          </a:p>
+          <a:p>
+            <a:endParaRPr lang="en-US" i="1"/>
           </a:p>
         </p:txBody>
       </p:sp>
@@ -4069,52 +4138,42 @@
           <a:lstStyle/>
           <a:p>
             <a:r>
-              <a:rPr lang="en-US" dirty="0"/>
+              <a:rPr lang="en-US"/>
               <a:t>Actors and main supported functionalities</a:t>
             </a:r>
           </a:p>
         </p:txBody>
       </p:sp>
-      <p:sp>
-        <p:nvSpPr>
-          <p:cNvPr id="3" name="CasellaDiTesto 2">
+      <p:pic>
+        <p:nvPicPr>
+          <p:cNvPr id="21" name="Immagine 20" descr="Immagine che contiene testo, schermata, cerchio, Carattere&#10;&#10;Descrizione generata automaticamente">
             <a:extLst>
               <a:ext uri="{FF2B5EF4-FFF2-40B4-BE49-F238E27FC236}">
-                <a16:creationId xmlns:a16="http://schemas.microsoft.com/office/drawing/2014/main" id="{391F4034-971B-8A4B-888B-5902E8333D6B}"/>
+                <a16:creationId xmlns:a16="http://schemas.microsoft.com/office/drawing/2014/main" id="{2536A74A-270C-7252-0F0D-859DED1CB262}"/>
               </a:ext>
             </a:extLst>
           </p:cNvPr>
-          <p:cNvSpPr txBox="1"/>
+          <p:cNvPicPr>
+            <a:picLocks noChangeAspect="1"/>
+          </p:cNvPicPr>
           <p:nvPr/>
-        </p:nvSpPr>
-        <p:spPr>
-          <a:xfrm>
-            <a:off x="457200" y="1812471"/>
-            <a:ext cx="8213271" cy="369332"/>
+        </p:nvPicPr>
+        <p:blipFill>
+          <a:blip r:embed="rId2"/>
+          <a:stretch>
+            <a:fillRect/>
+          </a:stretch>
+        </p:blipFill>
+        <p:spPr>
+          <a:xfrm>
+            <a:off x="1048914" y="1441960"/>
+            <a:ext cx="7029450" cy="4562475"/>
           </a:xfrm>
           <a:prstGeom prst="rect">
             <a:avLst/>
           </a:prstGeom>
-          <a:noFill/>
-        </p:spPr>
-        <p:txBody>
-          <a:bodyPr wrap="square" rtlCol="0">
-            <a:spAutoFit/>
-          </a:bodyPr>
-          <a:lstStyle/>
-          <a:p>
-            <a:r>
-              <a:rPr lang="en-US" dirty="0"/>
-              <a:t>A simplified use case diagram </a:t>
-            </a:r>
-            <a:r>
-              <a:rPr lang="en-US"/>
-              <a:t>can be used.</a:t>
-            </a:r>
-            <a:endParaRPr lang="en-US" dirty="0"/>
-          </a:p>
-        </p:txBody>
-      </p:sp>
+        </p:spPr>
+      </p:pic>
     </p:spTree>
     <p:extLst>
       <p:ext uri="{BB962C8B-B14F-4D97-AF65-F5344CB8AC3E}">
@@ -4167,7 +4226,7 @@
           <a:lstStyle/>
           <a:p>
             <a:r>
-              <a:rPr lang="en-US" dirty="0"/>
+              <a:rPr lang="en-US"/>
               <a:t>Dataset Description</a:t>
             </a:r>
           </a:p>
@@ -4203,65 +4262,65 @@
           <a:p>
             <a:pPr lvl="0"/>
             <a:r>
-              <a:rPr lang="en-US" sz="2000" b="1" i="1" dirty="0"/>
+              <a:rPr lang="en-US" sz="2000" b="1" i="1"/>
               <a:t>Source:</a:t>
             </a:r>
           </a:p>
           <a:p>
             <a:pPr lvl="0"/>
-            <a:endParaRPr lang="en-US" sz="2000" b="1" i="1" dirty="0"/>
+            <a:endParaRPr lang="en-US" sz="2000" b="1" i="1"/>
           </a:p>
           <a:p>
             <a:pPr lvl="0"/>
             <a:r>
-              <a:rPr lang="en-US" sz="2000" b="1" i="1" dirty="0"/>
+              <a:rPr lang="en-US" sz="2000" b="1" i="1"/>
               <a:t>Description:</a:t>
             </a:r>
           </a:p>
           <a:p>
             <a:pPr lvl="0"/>
-            <a:endParaRPr lang="en-US" sz="2000" b="1" i="1" dirty="0"/>
+            <a:endParaRPr lang="en-US" sz="2000" b="1" i="1"/>
           </a:p>
           <a:p>
             <a:pPr lvl="0"/>
             <a:r>
-              <a:rPr lang="en-US" sz="2000" b="1" i="1" dirty="0"/>
+              <a:rPr lang="en-US" sz="2000" b="1" i="1"/>
               <a:t>Volume:</a:t>
             </a:r>
           </a:p>
           <a:p>
             <a:pPr lvl="0"/>
-            <a:endParaRPr lang="en-US" sz="2000" b="1" i="1" dirty="0"/>
+            <a:endParaRPr lang="en-US" sz="2000" b="1" i="1"/>
           </a:p>
           <a:p>
             <a:pPr lvl="0"/>
             <a:r>
-              <a:rPr lang="en-US" sz="2000" b="1" i="1" dirty="0"/>
+              <a:rPr lang="en-US" sz="2000" b="1" i="1"/>
               <a:t>Variety</a:t>
             </a:r>
             <a:r>
-              <a:rPr lang="en-US" sz="2000" dirty="0"/>
+              <a:rPr lang="en-US" sz="2000"/>
               <a:t>: </a:t>
             </a:r>
           </a:p>
           <a:p>
             <a:pPr lvl="0"/>
-            <a:endParaRPr lang="en-US" sz="2000" b="1" i="1" dirty="0"/>
+            <a:endParaRPr lang="en-US" sz="2000" b="1" i="1"/>
           </a:p>
           <a:p>
             <a:pPr lvl="0"/>
             <a:r>
-              <a:rPr lang="en-US" sz="2000" b="1" i="1" dirty="0"/>
+              <a:rPr lang="en-US" sz="2000" b="1" i="1"/>
               <a:t>Velocity/Variability</a:t>
             </a:r>
             <a:r>
-              <a:rPr lang="en-US" sz="2000" dirty="0"/>
+              <a:rPr lang="en-US" sz="2000"/>
               <a:t>:</a:t>
             </a:r>
-            <a:endParaRPr lang="it-IT" sz="2000" dirty="0"/>
-          </a:p>
-          <a:p>
-            <a:endParaRPr lang="en-US" sz="2000" dirty="0"/>
+            <a:endParaRPr lang="it-IT" sz="2000"/>
+          </a:p>
+          <a:p>
+            <a:endParaRPr lang="en-US" sz="2000"/>
           </a:p>
         </p:txBody>
       </p:sp>
@@ -4317,12 +4376,42 @@
           <a:lstStyle/>
           <a:p>
             <a:r>
-              <a:rPr lang="en-US" dirty="0"/>
+              <a:rPr lang="en-US"/>
               <a:t>Preliminary UML Class Diagram</a:t>
             </a:r>
           </a:p>
         </p:txBody>
       </p:sp>
+      <p:pic>
+        <p:nvPicPr>
+          <p:cNvPr id="10" name="Immagine 9" descr="Immagine che contiene schermata, testo, diagramma, Carattere&#10;&#10;Descrizione generata automaticamente">
+            <a:extLst>
+              <a:ext uri="{FF2B5EF4-FFF2-40B4-BE49-F238E27FC236}">
+                <a16:creationId xmlns:a16="http://schemas.microsoft.com/office/drawing/2014/main" id="{83334F44-CA9C-2ADD-63C2-E69D7E360544}"/>
+              </a:ext>
+            </a:extLst>
+          </p:cNvPr>
+          <p:cNvPicPr>
+            <a:picLocks noChangeAspect="1"/>
+          </p:cNvPicPr>
+          <p:nvPr/>
+        </p:nvPicPr>
+        <p:blipFill>
+          <a:blip r:embed="rId2"/>
+          <a:stretch>
+            <a:fillRect/>
+          </a:stretch>
+        </p:blipFill>
+        <p:spPr>
+          <a:xfrm>
+            <a:off x="1323975" y="1105021"/>
+            <a:ext cx="6496050" cy="4791075"/>
+          </a:xfrm>
+          <a:prstGeom prst="rect">
+            <a:avLst/>
+          </a:prstGeom>
+        </p:spPr>
+      </p:pic>
     </p:spTree>
     <p:extLst>
       <p:ext uri="{BB962C8B-B14F-4D97-AF65-F5344CB8AC3E}">
@@ -4377,16 +4466,235 @@
           <a:lstStyle/>
           <a:p>
             <a:r>
-              <a:rPr lang="en-US" dirty="0"/>
+              <a:rPr lang="en-US"/>
               <a:t>Requirements and Entities </a:t>
             </a:r>
             <a:br>
-              <a:rPr lang="en-US" dirty="0"/>
+              <a:rPr lang="en-US"/>
             </a:br>
             <a:r>
-              <a:rPr lang="en-US" dirty="0"/>
+              <a:rPr lang="en-US"/>
               <a:t>handled by Document DB</a:t>
             </a:r>
+          </a:p>
+        </p:txBody>
+      </p:sp>
+      <p:sp>
+        <p:nvSpPr>
+          <p:cNvPr id="3" name="CasellaDiTesto 2">
+            <a:extLst>
+              <a:ext uri="{FF2B5EF4-FFF2-40B4-BE49-F238E27FC236}">
+                <a16:creationId xmlns:a16="http://schemas.microsoft.com/office/drawing/2014/main" id="{493E5FF6-5099-E09E-E2CF-34357F21AD91}"/>
+              </a:ext>
+            </a:extLst>
+          </p:cNvPr>
+          <p:cNvSpPr txBox="1"/>
+          <p:nvPr/>
+        </p:nvSpPr>
+        <p:spPr>
+          <a:xfrm>
+            <a:off x="199462" y="1743075"/>
+            <a:ext cx="2301240" cy="2585323"/>
+          </a:xfrm>
+          <a:prstGeom prst="rect">
+            <a:avLst/>
+          </a:prstGeom>
+          <a:noFill/>
+        </p:spPr>
+        <p:txBody>
+          <a:bodyPr wrap="square" rtlCol="0">
+            <a:spAutoFit/>
+          </a:bodyPr>
+          <a:lstStyle/>
+          <a:p>
+            <a:pPr>
+              <a:lnSpc>
+                <a:spcPct val="200000"/>
+              </a:lnSpc>
+            </a:pPr>
+            <a:r>
+              <a:rPr lang="it-IT" b="1" err="1"/>
+              <a:t>Entities</a:t>
+            </a:r>
+            <a:r>
+              <a:rPr lang="it-IT" b="1"/>
+              <a:t> </a:t>
+            </a:r>
+            <a:r>
+              <a:rPr lang="it-IT" b="1" err="1"/>
+              <a:t>involved</a:t>
+            </a:r>
+            <a:r>
+              <a:rPr lang="it-IT" b="1"/>
+              <a:t>:</a:t>
+            </a:r>
+          </a:p>
+          <a:p>
+            <a:pPr marL="285750" indent="-285750">
+              <a:buFont typeface="Arial" panose="020B0604020202020204" pitchFamily="34" charset="0"/>
+              <a:buChar char="•"/>
+            </a:pPr>
+            <a:r>
+              <a:rPr lang="en-US"/>
+              <a:t>User</a:t>
+            </a:r>
+          </a:p>
+          <a:p>
+            <a:pPr marL="285750" indent="-285750">
+              <a:buFont typeface="Arial" panose="020B0604020202020204" pitchFamily="34" charset="0"/>
+              <a:buChar char="•"/>
+            </a:pPr>
+            <a:r>
+              <a:rPr lang="en-US"/>
+              <a:t>Game</a:t>
+            </a:r>
+          </a:p>
+          <a:p>
+            <a:pPr marL="285750" indent="-285750">
+              <a:buFont typeface="Arial" panose="020B0604020202020204" pitchFamily="34" charset="0"/>
+              <a:buChar char="•"/>
+            </a:pPr>
+            <a:r>
+              <a:rPr lang="en-US"/>
+              <a:t>Review</a:t>
+            </a:r>
+          </a:p>
+          <a:p>
+            <a:pPr marL="285750" indent="-285750">
+              <a:buFont typeface="Arial" panose="020B0604020202020204" pitchFamily="34" charset="0"/>
+              <a:buChar char="•"/>
+            </a:pPr>
+            <a:r>
+              <a:rPr lang="en-US"/>
+              <a:t>Library</a:t>
+            </a:r>
+          </a:p>
+          <a:p>
+            <a:pPr marL="285750" indent="-285750">
+              <a:buFont typeface="Arial" panose="020B0604020202020204" pitchFamily="34" charset="0"/>
+              <a:buChar char="•"/>
+            </a:pPr>
+            <a:r>
+              <a:rPr lang="en-US"/>
+              <a:t>Wishlist</a:t>
+            </a:r>
+          </a:p>
+          <a:p>
+            <a:pPr marL="285750" indent="-285750">
+              <a:buFont typeface="Arial" panose="020B0604020202020204" pitchFamily="34" charset="0"/>
+              <a:buChar char="•"/>
+            </a:pPr>
+            <a:r>
+              <a:rPr lang="en-US"/>
+              <a:t>Platform</a:t>
+            </a:r>
+          </a:p>
+          <a:p>
+            <a:pPr marL="285750" indent="-285750">
+              <a:buFont typeface="Arial" panose="020B0604020202020204" pitchFamily="34" charset="0"/>
+              <a:buChar char="•"/>
+            </a:pPr>
+            <a:r>
+              <a:rPr lang="en-US"/>
+              <a:t>Company</a:t>
+            </a:r>
+            <a:endParaRPr lang="it-IT"/>
+          </a:p>
+        </p:txBody>
+      </p:sp>
+      <p:sp>
+        <p:nvSpPr>
+          <p:cNvPr id="4" name="CasellaDiTesto 3">
+            <a:extLst>
+              <a:ext uri="{FF2B5EF4-FFF2-40B4-BE49-F238E27FC236}">
+                <a16:creationId xmlns:a16="http://schemas.microsoft.com/office/drawing/2014/main" id="{EAF93C3E-6D77-1233-2043-F8B626BEAEFA}"/>
+              </a:ext>
+            </a:extLst>
+          </p:cNvPr>
+          <p:cNvSpPr txBox="1"/>
+          <p:nvPr/>
+        </p:nvSpPr>
+        <p:spPr>
+          <a:xfrm>
+            <a:off x="2343713" y="1640711"/>
+            <a:ext cx="6600825" cy="3793603"/>
+          </a:xfrm>
+          <a:prstGeom prst="rect">
+            <a:avLst/>
+          </a:prstGeom>
+          <a:noFill/>
+        </p:spPr>
+        <p:txBody>
+          <a:bodyPr wrap="square" rtlCol="0">
+            <a:spAutoFit/>
+          </a:bodyPr>
+          <a:lstStyle/>
+          <a:p>
+            <a:pPr>
+              <a:lnSpc>
+                <a:spcPct val="150000"/>
+              </a:lnSpc>
+            </a:pPr>
+            <a:r>
+              <a:rPr lang="en-US" b="1"/>
+              <a:t>Main requirements</a:t>
+            </a:r>
+            <a:r>
+              <a:rPr lang="it-IT" b="1"/>
+              <a:t>:</a:t>
+            </a:r>
+          </a:p>
+          <a:p>
+            <a:pPr marL="285750" indent="-285750">
+              <a:lnSpc>
+                <a:spcPct val="150000"/>
+              </a:lnSpc>
+              <a:buFont typeface="Arial" panose="020B0604020202020204" pitchFamily="34" charset="0"/>
+              <a:buChar char="•"/>
+            </a:pPr>
+            <a:r>
+              <a:rPr lang="en-US" sz="1600"/>
+              <a:t>Seeing the most added in library games during the current year for each specific platform in order to display them into the "Highlighted" section of the application</a:t>
+            </a:r>
+            <a:br>
+              <a:rPr lang="en-US" sz="1600"/>
+            </a:br>
+            <a:endParaRPr lang="en-US" sz="1600"/>
+          </a:p>
+          <a:p>
+            <a:pPr marL="285750" indent="-285750">
+              <a:lnSpc>
+                <a:spcPct val="150000"/>
+              </a:lnSpc>
+              <a:buFont typeface="Arial" panose="020B0604020202020204" pitchFamily="34" charset="0"/>
+              <a:buChar char="•"/>
+            </a:pPr>
+            <a:r>
+              <a:rPr lang="en-US" sz="1600"/>
+              <a:t>Show the "Not recommended" reviews for the games you have put into the </a:t>
+            </a:r>
+            <a:r>
+              <a:rPr lang="en-US" sz="1600" err="1"/>
+              <a:t>wishlist</a:t>
+            </a:r>
+            <a:br>
+              <a:rPr lang="en-US" sz="1600"/>
+            </a:br>
+            <a:endParaRPr lang="en-US" sz="1600"/>
+          </a:p>
+          <a:p>
+            <a:pPr marL="285750" indent="-285750">
+              <a:lnSpc>
+                <a:spcPct val="150000"/>
+              </a:lnSpc>
+              <a:buFont typeface="Arial" panose="020B0604020202020204" pitchFamily="34" charset="0"/>
+              <a:buChar char="•"/>
+            </a:pPr>
+            <a:r>
+              <a:rPr lang="en-US" sz="1600"/>
+              <a:t>The user can view the percentage distribution of games played, grouped by genre selecting a time period.</a:t>
+            </a:r>
+            <a:endParaRPr lang="it-IT" sz="1600"/>
           </a:p>
         </p:txBody>
       </p:sp>
@@ -4444,15 +4752,436 @@
           <a:lstStyle/>
           <a:p>
             <a:r>
-              <a:rPr lang="en-US" dirty="0"/>
+              <a:rPr lang="en-US"/>
               <a:t>Requirements and Entities </a:t>
             </a:r>
             <a:br>
-              <a:rPr lang="en-US" dirty="0"/>
+              <a:rPr lang="en-US"/>
             </a:br>
             <a:r>
-              <a:rPr lang="en-US" dirty="0"/>
-              <a:t>handled by Key-Value DB</a:t>
+              <a:rPr lang="en-US"/>
+              <a:t>handled by Graph DB</a:t>
+            </a:r>
+          </a:p>
+        </p:txBody>
+      </p:sp>
+      <p:sp>
+        <p:nvSpPr>
+          <p:cNvPr id="4" name="Ovale 3">
+            <a:extLst>
+              <a:ext uri="{FF2B5EF4-FFF2-40B4-BE49-F238E27FC236}">
+                <a16:creationId xmlns:a16="http://schemas.microsoft.com/office/drawing/2014/main" id="{3115FF14-BBDB-8A7C-6C7A-B1E5B235D53A}"/>
+              </a:ext>
+            </a:extLst>
+          </p:cNvPr>
+          <p:cNvSpPr/>
+          <p:nvPr/>
+        </p:nvSpPr>
+        <p:spPr>
+          <a:xfrm>
+            <a:off x="1119938" y="1702308"/>
+            <a:ext cx="969264" cy="768096"/>
+          </a:xfrm>
+          <a:prstGeom prst="ellipse">
+            <a:avLst/>
+          </a:prstGeom>
+        </p:spPr>
+        <p:style>
+          <a:lnRef idx="1">
+            <a:schemeClr val="accent1"/>
+          </a:lnRef>
+          <a:fillRef idx="3">
+            <a:schemeClr val="accent1"/>
+          </a:fillRef>
+          <a:effectRef idx="2">
+            <a:schemeClr val="accent1"/>
+          </a:effectRef>
+          <a:fontRef idx="minor">
+            <a:schemeClr val="lt1"/>
+          </a:fontRef>
+        </p:style>
+        <p:txBody>
+          <a:bodyPr rtlCol="0" anchor="ctr"/>
+          <a:lstStyle/>
+          <a:p>
+            <a:pPr algn="ctr"/>
+            <a:r>
+              <a:rPr lang="it-IT"/>
+              <a:t>User</a:t>
+            </a:r>
+          </a:p>
+        </p:txBody>
+      </p:sp>
+      <p:cxnSp>
+        <p:nvCxnSpPr>
+          <p:cNvPr id="6" name="Connettore 2 5">
+            <a:extLst>
+              <a:ext uri="{FF2B5EF4-FFF2-40B4-BE49-F238E27FC236}">
+                <a16:creationId xmlns:a16="http://schemas.microsoft.com/office/drawing/2014/main" id="{C07B8E69-7BFB-1311-585A-50AD11EBA19C}"/>
+              </a:ext>
+            </a:extLst>
+          </p:cNvPr>
+          <p:cNvCxnSpPr>
+            <a:cxnSpLocks/>
+            <a:stCxn id="4" idx="4"/>
+            <a:endCxn id="4" idx="2"/>
+          </p:cNvCxnSpPr>
+          <p:nvPr/>
+        </p:nvCxnSpPr>
+        <p:spPr>
+          <a:xfrm rot="5400000" flipH="1">
+            <a:off x="1170230" y="2036064"/>
+            <a:ext cx="384048" cy="484632"/>
+          </a:xfrm>
+          <a:prstGeom prst="bentConnector4">
+            <a:avLst>
+              <a:gd name="adj1" fmla="val -59524"/>
+              <a:gd name="adj2" fmla="val 147170"/>
+            </a:avLst>
+          </a:prstGeom>
+          <a:ln>
+            <a:tailEnd type="triangle"/>
+          </a:ln>
+        </p:spPr>
+        <p:style>
+          <a:lnRef idx="2">
+            <a:schemeClr val="accent1"/>
+          </a:lnRef>
+          <a:fillRef idx="0">
+            <a:schemeClr val="accent1"/>
+          </a:fillRef>
+          <a:effectRef idx="1">
+            <a:schemeClr val="accent1"/>
+          </a:effectRef>
+          <a:fontRef idx="minor">
+            <a:schemeClr val="tx1"/>
+          </a:fontRef>
+        </p:style>
+      </p:cxnSp>
+      <p:sp>
+        <p:nvSpPr>
+          <p:cNvPr id="19" name="Ovale 18">
+            <a:extLst>
+              <a:ext uri="{FF2B5EF4-FFF2-40B4-BE49-F238E27FC236}">
+                <a16:creationId xmlns:a16="http://schemas.microsoft.com/office/drawing/2014/main" id="{D91F8518-1FCB-5FC7-215D-A13340D643C1}"/>
+              </a:ext>
+            </a:extLst>
+          </p:cNvPr>
+          <p:cNvSpPr/>
+          <p:nvPr/>
+        </p:nvSpPr>
+        <p:spPr>
+          <a:xfrm>
+            <a:off x="4674037" y="1702308"/>
+            <a:ext cx="1161288" cy="768096"/>
+          </a:xfrm>
+          <a:prstGeom prst="ellipse">
+            <a:avLst/>
+          </a:prstGeom>
+        </p:spPr>
+        <p:style>
+          <a:lnRef idx="1">
+            <a:schemeClr val="accent1"/>
+          </a:lnRef>
+          <a:fillRef idx="3">
+            <a:schemeClr val="accent1"/>
+          </a:fillRef>
+          <a:effectRef idx="2">
+            <a:schemeClr val="accent1"/>
+          </a:effectRef>
+          <a:fontRef idx="minor">
+            <a:schemeClr val="lt1"/>
+          </a:fontRef>
+        </p:style>
+        <p:txBody>
+          <a:bodyPr rtlCol="0" anchor="ctr"/>
+          <a:lstStyle/>
+          <a:p>
+            <a:pPr algn="ctr"/>
+            <a:r>
+              <a:rPr lang="it-IT"/>
+              <a:t>Game</a:t>
+            </a:r>
+          </a:p>
+        </p:txBody>
+      </p:sp>
+      <p:cxnSp>
+        <p:nvCxnSpPr>
+          <p:cNvPr id="21" name="Connettore 2 20">
+            <a:extLst>
+              <a:ext uri="{FF2B5EF4-FFF2-40B4-BE49-F238E27FC236}">
+                <a16:creationId xmlns:a16="http://schemas.microsoft.com/office/drawing/2014/main" id="{8C67F0C2-63DF-9EE9-0C4D-6F2FA89DD89D}"/>
+              </a:ext>
+            </a:extLst>
+          </p:cNvPr>
+          <p:cNvCxnSpPr>
+            <a:cxnSpLocks/>
+            <a:stCxn id="4" idx="6"/>
+            <a:endCxn id="19" idx="2"/>
+          </p:cNvCxnSpPr>
+          <p:nvPr/>
+        </p:nvCxnSpPr>
+        <p:spPr>
+          <a:xfrm>
+            <a:off x="2089202" y="2086356"/>
+            <a:ext cx="2584835" cy="0"/>
+          </a:xfrm>
+          <a:prstGeom prst="straightConnector1">
+            <a:avLst/>
+          </a:prstGeom>
+          <a:ln>
+            <a:tailEnd type="triangle"/>
+          </a:ln>
+        </p:spPr>
+        <p:style>
+          <a:lnRef idx="2">
+            <a:schemeClr val="accent1"/>
+          </a:lnRef>
+          <a:fillRef idx="0">
+            <a:schemeClr val="accent1"/>
+          </a:fillRef>
+          <a:effectRef idx="1">
+            <a:schemeClr val="accent1"/>
+          </a:effectRef>
+          <a:fontRef idx="minor">
+            <a:schemeClr val="tx1"/>
+          </a:fontRef>
+        </p:style>
+      </p:cxnSp>
+      <p:sp>
+        <p:nvSpPr>
+          <p:cNvPr id="24" name="CasellaDiTesto 23">
+            <a:extLst>
+              <a:ext uri="{FF2B5EF4-FFF2-40B4-BE49-F238E27FC236}">
+                <a16:creationId xmlns:a16="http://schemas.microsoft.com/office/drawing/2014/main" id="{1F02B99C-C8D8-13B7-491D-1705E555FEDA}"/>
+              </a:ext>
+            </a:extLst>
+          </p:cNvPr>
+          <p:cNvSpPr txBox="1"/>
+          <p:nvPr/>
+        </p:nvSpPr>
+        <p:spPr>
+          <a:xfrm>
+            <a:off x="2403942" y="1702308"/>
+            <a:ext cx="1929520" cy="369332"/>
+          </a:xfrm>
+          <a:prstGeom prst="rect">
+            <a:avLst/>
+          </a:prstGeom>
+          <a:noFill/>
+        </p:spPr>
+        <p:txBody>
+          <a:bodyPr wrap="square" rtlCol="0">
+            <a:spAutoFit/>
+          </a:bodyPr>
+          <a:lstStyle/>
+          <a:p>
+            <a:r>
+              <a:rPr lang="it-IT"/>
+              <a:t>:ADD_TO_LIBRARY</a:t>
+            </a:r>
+          </a:p>
+        </p:txBody>
+      </p:sp>
+      <p:sp>
+        <p:nvSpPr>
+          <p:cNvPr id="25" name="CasellaDiTesto 24">
+            <a:extLst>
+              <a:ext uri="{FF2B5EF4-FFF2-40B4-BE49-F238E27FC236}">
+                <a16:creationId xmlns:a16="http://schemas.microsoft.com/office/drawing/2014/main" id="{6C957354-136C-421C-A0EB-4482C0DA2BFD}"/>
+              </a:ext>
+            </a:extLst>
+          </p:cNvPr>
+          <p:cNvSpPr txBox="1"/>
+          <p:nvPr/>
+        </p:nvSpPr>
+        <p:spPr>
+          <a:xfrm>
+            <a:off x="809804" y="2766060"/>
+            <a:ext cx="1104900" cy="369332"/>
+          </a:xfrm>
+          <a:prstGeom prst="rect">
+            <a:avLst/>
+          </a:prstGeom>
+          <a:noFill/>
+        </p:spPr>
+        <p:txBody>
+          <a:bodyPr wrap="square" rtlCol="0">
+            <a:spAutoFit/>
+          </a:bodyPr>
+          <a:lstStyle/>
+          <a:p>
+            <a:r>
+              <a:rPr lang="it-IT"/>
+              <a:t>:FOLLOW</a:t>
+            </a:r>
+          </a:p>
+        </p:txBody>
+      </p:sp>
+      <p:sp>
+        <p:nvSpPr>
+          <p:cNvPr id="26" name="CasellaDiTesto 25">
+            <a:extLst>
+              <a:ext uri="{FF2B5EF4-FFF2-40B4-BE49-F238E27FC236}">
+                <a16:creationId xmlns:a16="http://schemas.microsoft.com/office/drawing/2014/main" id="{CC4CE4C5-4655-7CD3-F0A9-58C333FF8F6C}"/>
+              </a:ext>
+            </a:extLst>
+          </p:cNvPr>
+          <p:cNvSpPr txBox="1"/>
+          <p:nvPr/>
+        </p:nvSpPr>
+        <p:spPr>
+          <a:xfrm>
+            <a:off x="266700" y="3323667"/>
+            <a:ext cx="8610600" cy="2680862"/>
+          </a:xfrm>
+          <a:prstGeom prst="rect">
+            <a:avLst/>
+          </a:prstGeom>
+          <a:noFill/>
+        </p:spPr>
+        <p:txBody>
+          <a:bodyPr wrap="square" rtlCol="0">
+            <a:spAutoFit/>
+          </a:bodyPr>
+          <a:lstStyle/>
+          <a:p>
+            <a:r>
+              <a:rPr lang="it-IT" b="1" err="1"/>
+              <a:t>Main</a:t>
+            </a:r>
+            <a:r>
+              <a:rPr lang="it-IT" b="1"/>
+              <a:t> </a:t>
+            </a:r>
+            <a:r>
+              <a:rPr lang="it-IT" b="1" err="1"/>
+              <a:t>requirements</a:t>
+            </a:r>
+            <a:r>
+              <a:rPr lang="it-IT" b="1"/>
+              <a:t>:</a:t>
+            </a:r>
+          </a:p>
+          <a:p>
+            <a:endParaRPr lang="it-IT"/>
+          </a:p>
+          <a:p>
+            <a:pPr marL="285750" indent="-285750">
+              <a:lnSpc>
+                <a:spcPct val="150000"/>
+              </a:lnSpc>
+              <a:buFont typeface="Arial" panose="020B0604020202020204" pitchFamily="34" charset="0"/>
+              <a:buChar char="•"/>
+            </a:pPr>
+            <a:r>
+              <a:rPr lang="en-US"/>
+              <a:t>A registered user is suggested with the people he/she might know</a:t>
+            </a:r>
+            <a:endParaRPr lang="it-IT"/>
+          </a:p>
+          <a:p>
+            <a:pPr marL="285750" indent="-285750">
+              <a:lnSpc>
+                <a:spcPct val="150000"/>
+              </a:lnSpc>
+              <a:buFont typeface="Arial" panose="020B0604020202020204" pitchFamily="34" charset="0"/>
+              <a:buChar char="•"/>
+            </a:pPr>
+            <a:r>
+              <a:rPr lang="en-US"/>
+              <a:t>A registered user is suggested with the added to library by his/her friends (more popular games first)</a:t>
+            </a:r>
+          </a:p>
+          <a:p>
+            <a:pPr marL="285750" indent="-285750">
+              <a:lnSpc>
+                <a:spcPct val="150000"/>
+              </a:lnSpc>
+              <a:buFont typeface="Arial" panose="020B0604020202020204" pitchFamily="34" charset="0"/>
+              <a:buChar char="•"/>
+            </a:pPr>
+            <a:r>
+              <a:rPr lang="en-US"/>
+              <a:t>Rank the user according to the number of connections with other user and with the number of games they added.</a:t>
+            </a:r>
+          </a:p>
+        </p:txBody>
+      </p:sp>
+      <p:sp>
+        <p:nvSpPr>
+          <p:cNvPr id="28" name="CasellaDiTesto 27">
+            <a:extLst>
+              <a:ext uri="{FF2B5EF4-FFF2-40B4-BE49-F238E27FC236}">
+                <a16:creationId xmlns:a16="http://schemas.microsoft.com/office/drawing/2014/main" id="{32BF0089-F68C-1213-FD1A-F5C0B4D4E514}"/>
+              </a:ext>
+            </a:extLst>
+          </p:cNvPr>
+          <p:cNvSpPr txBox="1"/>
+          <p:nvPr/>
+        </p:nvSpPr>
+        <p:spPr>
+          <a:xfrm>
+            <a:off x="6576060" y="1379220"/>
+            <a:ext cx="2301240" cy="1676741"/>
+          </a:xfrm>
+          <a:prstGeom prst="rect">
+            <a:avLst/>
+          </a:prstGeom>
+          <a:noFill/>
+        </p:spPr>
+        <p:txBody>
+          <a:bodyPr wrap="square" rtlCol="0">
+            <a:spAutoFit/>
+          </a:bodyPr>
+          <a:lstStyle/>
+          <a:p>
+            <a:pPr>
+              <a:lnSpc>
+                <a:spcPct val="200000"/>
+              </a:lnSpc>
+            </a:pPr>
+            <a:r>
+              <a:rPr lang="it-IT" b="1" err="1"/>
+              <a:t>Entities</a:t>
+            </a:r>
+            <a:r>
+              <a:rPr lang="it-IT" b="1"/>
+              <a:t> </a:t>
+            </a:r>
+            <a:r>
+              <a:rPr lang="it-IT" b="1" err="1"/>
+              <a:t>involved</a:t>
+            </a:r>
+            <a:r>
+              <a:rPr lang="it-IT" b="1"/>
+              <a:t>:</a:t>
+            </a:r>
+          </a:p>
+          <a:p>
+            <a:pPr marL="285750" indent="-285750">
+              <a:lnSpc>
+                <a:spcPct val="200000"/>
+              </a:lnSpc>
+              <a:buFont typeface="Arial" panose="020B0604020202020204" pitchFamily="34" charset="0"/>
+              <a:buChar char="•"/>
+            </a:pPr>
+            <a:r>
+              <a:rPr lang="it-IT"/>
+              <a:t>User</a:t>
+            </a:r>
+          </a:p>
+          <a:p>
+            <a:pPr marL="285750" indent="-285750">
+              <a:lnSpc>
+                <a:spcPct val="200000"/>
+              </a:lnSpc>
+              <a:buFont typeface="Arial" panose="020B0604020202020204" pitchFamily="34" charset="0"/>
+              <a:buChar char="•"/>
+            </a:pPr>
+            <a:r>
+              <a:rPr lang="it-IT"/>
+              <a:t>Game</a:t>
             </a:r>
           </a:p>
         </p:txBody>
@@ -4460,7 +5189,7 @@
     </p:spTree>
     <p:extLst>
       <p:ext uri="{BB962C8B-B14F-4D97-AF65-F5344CB8AC3E}">
-        <p14:creationId xmlns:p14="http://schemas.microsoft.com/office/powerpoint/2010/main" val="4165861081"/>
+        <p14:creationId xmlns:p14="http://schemas.microsoft.com/office/powerpoint/2010/main" val="1127430590"/>
       </p:ext>
     </p:extLst>
   </p:cSld>
@@ -4492,73 +5221,6 @@
           <p:cNvPr id="2" name="Titolo 1">
             <a:extLst>
               <a:ext uri="{FF2B5EF4-FFF2-40B4-BE49-F238E27FC236}">
-                <a16:creationId xmlns:a16="http://schemas.microsoft.com/office/drawing/2014/main" id="{B8C7EEC7-48BB-B542-9A2A-E3C09D99B916}"/>
-              </a:ext>
-            </a:extLst>
-          </p:cNvPr>
-          <p:cNvSpPr>
-            <a:spLocks noGrp="1"/>
-          </p:cNvSpPr>
-          <p:nvPr>
-            <p:ph type="title"/>
-          </p:nvPr>
-        </p:nvSpPr>
-        <p:spPr/>
-        <p:txBody>
-          <a:bodyPr>
-            <a:normAutofit fontScale="90000"/>
-          </a:bodyPr>
-          <a:lstStyle/>
-          <a:p>
-            <a:r>
-              <a:rPr lang="en-US" dirty="0"/>
-              <a:t>Requirements and Entities </a:t>
-            </a:r>
-            <a:br>
-              <a:rPr lang="en-US" dirty="0"/>
-            </a:br>
-            <a:r>
-              <a:rPr lang="en-US" dirty="0"/>
-              <a:t>handled by Graph DB</a:t>
-            </a:r>
-          </a:p>
-        </p:txBody>
-      </p:sp>
-    </p:spTree>
-    <p:extLst>
-      <p:ext uri="{BB962C8B-B14F-4D97-AF65-F5344CB8AC3E}">
-        <p14:creationId xmlns:p14="http://schemas.microsoft.com/office/powerpoint/2010/main" val="1127430590"/>
-      </p:ext>
-    </p:extLst>
-  </p:cSld>
-  <p:clrMapOvr>
-    <a:masterClrMapping/>
-  </p:clrMapOvr>
-</p:sld>
-</file>
-
-<file path=ppt/slides/slide9.xml><?xml version="1.0" encoding="utf-8"?>
-<p:sld xmlns:a="http://schemas.openxmlformats.org/drawingml/2006/main" xmlns:r="http://schemas.openxmlformats.org/officeDocument/2006/relationships" xmlns:p="http://schemas.openxmlformats.org/presentationml/2006/main">
-  <p:cSld>
-    <p:spTree>
-      <p:nvGrpSpPr>
-        <p:cNvPr id="1" name=""/>
-        <p:cNvGrpSpPr/>
-        <p:nvPr/>
-      </p:nvGrpSpPr>
-      <p:grpSpPr>
-        <a:xfrm>
-          <a:off x="0" y="0"/>
-          <a:ext cx="0" cy="0"/>
-          <a:chOff x="0" y="0"/>
-          <a:chExt cx="0" cy="0"/>
-        </a:xfrm>
-      </p:grpSpPr>
-      <p:sp>
-        <p:nvSpPr>
-          <p:cNvPr id="2" name="Titolo 1">
-            <a:extLst>
-              <a:ext uri="{FF2B5EF4-FFF2-40B4-BE49-F238E27FC236}">
                 <a16:creationId xmlns:a16="http://schemas.microsoft.com/office/drawing/2014/main" id="{5A91C834-1531-EF45-9F75-1C146E72C46B}"/>
               </a:ext>
             </a:extLst>
@@ -4570,7 +5232,12 @@
             <p:ph type="title"/>
           </p:nvPr>
         </p:nvSpPr>
-        <p:spPr/>
+        <p:spPr>
+          <a:xfrm>
+            <a:off x="30341" y="0"/>
+            <a:ext cx="8761797" cy="1143000"/>
+          </a:xfrm>
+        </p:spPr>
         <p:txBody>
           <a:bodyPr>
             <a:normAutofit fontScale="90000"/>
@@ -4578,7 +5245,7 @@
           <a:lstStyle/>
           <a:p>
             <a:r>
-              <a:rPr lang="en-US" dirty="0"/>
+              <a:rPr lang="en-US"/>
               <a:t>Software Architecture Preliminary Idea</a:t>
             </a:r>
           </a:p>
@@ -4586,10 +5253,10 @@
       </p:sp>
       <p:sp>
         <p:nvSpPr>
-          <p:cNvPr id="3" name="CasellaDiTesto 2">
+          <p:cNvPr id="4" name="CasellaDiTesto 3">
             <a:extLst>
               <a:ext uri="{FF2B5EF4-FFF2-40B4-BE49-F238E27FC236}">
-                <a16:creationId xmlns:a16="http://schemas.microsoft.com/office/drawing/2014/main" id="{1106BE54-4991-7B40-B605-26279527E87B}"/>
+                <a16:creationId xmlns:a16="http://schemas.microsoft.com/office/drawing/2014/main" id="{25F5B5E3-2225-C060-D9A4-1D394107339D}"/>
               </a:ext>
             </a:extLst>
           </p:cNvPr>
@@ -4598,8 +5265,8 @@
         </p:nvSpPr>
         <p:spPr>
           <a:xfrm>
-            <a:off x="620486" y="1926770"/>
-            <a:ext cx="8180614" cy="646331"/>
+            <a:off x="359773" y="2394606"/>
+            <a:ext cx="971589" cy="646331"/>
           </a:xfrm>
           <a:prstGeom prst="rect">
             <a:avLst/>
@@ -4613,8 +5280,381 @@
           <a:lstStyle/>
           <a:p>
             <a:r>
-              <a:rPr lang="en-US" dirty="0"/>
-              <a:t>Include also the frameworks and tools that the group would like to use (programming languages, DBMSs, etc..)</a:t>
+              <a:rPr lang="it-IT" b="1" err="1"/>
+              <a:t>DBMSs</a:t>
+            </a:r>
+            <a:r>
+              <a:rPr lang="it-IT"/>
+              <a:t>:</a:t>
+            </a:r>
+          </a:p>
+          <a:p>
+            <a:endParaRPr lang="it-IT"/>
+          </a:p>
+        </p:txBody>
+      </p:sp>
+      <p:pic>
+        <p:nvPicPr>
+          <p:cNvPr id="2054" name="Picture 6">
+            <a:extLst>
+              <a:ext uri="{FF2B5EF4-FFF2-40B4-BE49-F238E27FC236}">
+                <a16:creationId xmlns:a16="http://schemas.microsoft.com/office/drawing/2014/main" id="{B2E2F0D0-C8F9-06C6-4DB3-2CF3FFC4A7EB}"/>
+              </a:ext>
+            </a:extLst>
+          </p:cNvPr>
+          <p:cNvPicPr>
+            <a:picLocks noChangeAspect="1" noChangeArrowheads="1"/>
+          </p:cNvPicPr>
+          <p:nvPr/>
+        </p:nvPicPr>
+        <p:blipFill>
+          <a:blip r:embed="rId2">
+            <a:extLst>
+              <a:ext uri="{28A0092B-C50C-407E-A947-70E740481C1C}">
+                <a14:useLocalDpi xmlns:a14="http://schemas.microsoft.com/office/drawing/2010/main" val="0"/>
+              </a:ext>
+            </a:extLst>
+          </a:blip>
+          <a:srcRect/>
+          <a:stretch>
+            <a:fillRect/>
+          </a:stretch>
+        </p:blipFill>
+        <p:spPr bwMode="auto">
+          <a:xfrm>
+            <a:off x="1993446" y="2231459"/>
+            <a:ext cx="2295838" cy="618999"/>
+          </a:xfrm>
+          <a:prstGeom prst="rect">
+            <a:avLst/>
+          </a:prstGeom>
+          <a:noFill/>
+          <a:extLst>
+            <a:ext uri="{909E8E84-426E-40DD-AFC4-6F175D3DCCD1}">
+              <a14:hiddenFill xmlns:a14="http://schemas.microsoft.com/office/drawing/2010/main">
+                <a:solidFill>
+                  <a:srgbClr val="FFFFFF"/>
+                </a:solidFill>
+              </a14:hiddenFill>
+            </a:ext>
+          </a:extLst>
+        </p:spPr>
+      </p:pic>
+      <p:pic>
+        <p:nvPicPr>
+          <p:cNvPr id="2056" name="Picture 8" descr="Neo4j - Wikipedia">
+            <a:extLst>
+              <a:ext uri="{FF2B5EF4-FFF2-40B4-BE49-F238E27FC236}">
+                <a16:creationId xmlns:a16="http://schemas.microsoft.com/office/drawing/2014/main" id="{9C604990-5AA4-789D-750A-9589D6DDACEC}"/>
+              </a:ext>
+            </a:extLst>
+          </p:cNvPr>
+          <p:cNvPicPr>
+            <a:picLocks noChangeAspect="1" noChangeArrowheads="1"/>
+          </p:cNvPicPr>
+          <p:nvPr/>
+        </p:nvPicPr>
+        <p:blipFill>
+          <a:blip r:embed="rId3">
+            <a:extLst>
+              <a:ext uri="{28A0092B-C50C-407E-A947-70E740481C1C}">
+                <a14:useLocalDpi xmlns:a14="http://schemas.microsoft.com/office/drawing/2010/main" val="0"/>
+              </a:ext>
+            </a:extLst>
+          </a:blip>
+          <a:srcRect/>
+          <a:stretch>
+            <a:fillRect/>
+          </a:stretch>
+        </p:blipFill>
+        <p:spPr bwMode="auto">
+          <a:xfrm>
+            <a:off x="5801037" y="2179282"/>
+            <a:ext cx="1937576" cy="727172"/>
+          </a:xfrm>
+          <a:prstGeom prst="rect">
+            <a:avLst/>
+          </a:prstGeom>
+          <a:noFill/>
+          <a:extLst>
+            <a:ext uri="{909E8E84-426E-40DD-AFC4-6F175D3DCCD1}">
+              <a14:hiddenFill xmlns:a14="http://schemas.microsoft.com/office/drawing/2010/main">
+                <a:solidFill>
+                  <a:srgbClr val="FFFFFF"/>
+                </a:solidFill>
+              </a14:hiddenFill>
+            </a:ext>
+          </a:extLst>
+        </p:spPr>
+      </p:pic>
+      <p:sp>
+        <p:nvSpPr>
+          <p:cNvPr id="8" name="CasellaDiTesto 7">
+            <a:extLst>
+              <a:ext uri="{FF2B5EF4-FFF2-40B4-BE49-F238E27FC236}">
+                <a16:creationId xmlns:a16="http://schemas.microsoft.com/office/drawing/2014/main" id="{43A5035B-B7DA-C932-6998-5835D2E5FEC8}"/>
+              </a:ext>
+            </a:extLst>
+          </p:cNvPr>
+          <p:cNvSpPr txBox="1"/>
+          <p:nvPr/>
+        </p:nvSpPr>
+        <p:spPr>
+          <a:xfrm>
+            <a:off x="359773" y="3336323"/>
+            <a:ext cx="8075568" cy="923330"/>
+          </a:xfrm>
+          <a:prstGeom prst="rect">
+            <a:avLst/>
+          </a:prstGeom>
+          <a:noFill/>
+        </p:spPr>
+        <p:txBody>
+          <a:bodyPr wrap="square" rtlCol="0">
+            <a:spAutoFit/>
+          </a:bodyPr>
+          <a:lstStyle/>
+          <a:p>
+            <a:r>
+              <a:rPr lang="it-IT" b="1"/>
+              <a:t>Programming </a:t>
+            </a:r>
+            <a:r>
+              <a:rPr lang="it-IT" b="1" err="1"/>
+              <a:t>languages</a:t>
+            </a:r>
+            <a:r>
+              <a:rPr lang="it-IT"/>
+              <a:t>: </a:t>
+            </a:r>
+            <a:r>
+              <a:rPr lang="it-IT" b="1"/>
+              <a:t>Java w/ </a:t>
+            </a:r>
+            <a:r>
+              <a:rPr lang="it-IT" b="1" err="1"/>
+              <a:t>Maven</a:t>
+            </a:r>
+            <a:r>
+              <a:rPr lang="it-IT" b="1"/>
+              <a:t> </a:t>
+            </a:r>
+            <a:r>
+              <a:rPr lang="it-IT"/>
+              <a:t>for </a:t>
+            </a:r>
+            <a:r>
+              <a:rPr lang="it-IT" err="1"/>
+              <a:t>handling</a:t>
+            </a:r>
+            <a:r>
+              <a:rPr lang="it-IT"/>
+              <a:t> </a:t>
+            </a:r>
+            <a:r>
+              <a:rPr lang="it-IT" err="1"/>
+              <a:t>dependecies</a:t>
+            </a:r>
+            <a:r>
+              <a:rPr lang="it-IT"/>
+              <a:t> (</a:t>
+            </a:r>
+            <a:r>
+              <a:rPr lang="it-IT" sz="1800" err="1">
+                <a:effectLst/>
+                <a:latin typeface="Calibri" panose="020F0502020204030204" pitchFamily="34" charset="0"/>
+                <a:ea typeface="SimSun" panose="02010600030101010101" pitchFamily="2" charset="-122"/>
+                <a:cs typeface="Times New Roman" panose="02020603050405020304" pitchFamily="18" charset="0"/>
+              </a:rPr>
+              <a:t>mongodb</a:t>
+            </a:r>
+            <a:r>
+              <a:rPr lang="it-IT" sz="1800">
+                <a:effectLst/>
+                <a:latin typeface="Calibri" panose="020F0502020204030204" pitchFamily="34" charset="0"/>
+                <a:ea typeface="SimSun" panose="02010600030101010101" pitchFamily="2" charset="-122"/>
+                <a:cs typeface="Times New Roman" panose="02020603050405020304" pitchFamily="18" charset="0"/>
+              </a:rPr>
+              <a:t>-driver-</a:t>
+            </a:r>
+            <a:r>
+              <a:rPr lang="it-IT" sz="1800" err="1">
+                <a:effectLst/>
+                <a:latin typeface="Calibri" panose="020F0502020204030204" pitchFamily="34" charset="0"/>
+                <a:ea typeface="SimSun" panose="02010600030101010101" pitchFamily="2" charset="-122"/>
+                <a:cs typeface="Times New Roman" panose="02020603050405020304" pitchFamily="18" charset="0"/>
+              </a:rPr>
+              <a:t>sync</a:t>
+            </a:r>
+            <a:r>
+              <a:rPr lang="it-IT" sz="1800">
+                <a:effectLst/>
+                <a:latin typeface="Calibri" panose="020F0502020204030204" pitchFamily="34" charset="0"/>
+                <a:ea typeface="SimSun" panose="02010600030101010101" pitchFamily="2" charset="-122"/>
+                <a:cs typeface="Times New Roman" panose="02020603050405020304" pitchFamily="18" charset="0"/>
+              </a:rPr>
+              <a:t>, </a:t>
+            </a:r>
+            <a:r>
+              <a:rPr lang="it-IT"/>
+              <a:t>neo4j-java-driver) and Python for Web </a:t>
+            </a:r>
+            <a:r>
+              <a:rPr lang="it-IT" err="1"/>
+              <a:t>Scraping</a:t>
+            </a:r>
+            <a:r>
+              <a:rPr lang="it-IT"/>
+              <a:t> part (</a:t>
+            </a:r>
+            <a:r>
+              <a:rPr lang="it-IT" err="1"/>
+              <a:t>requests</a:t>
+            </a:r>
+            <a:r>
+              <a:rPr lang="it-IT"/>
+              <a:t> &amp; </a:t>
+            </a:r>
+            <a:r>
+              <a:rPr lang="it-IT" err="1"/>
+              <a:t>Beautifoul</a:t>
+            </a:r>
+            <a:r>
+              <a:rPr lang="it-IT"/>
+              <a:t> </a:t>
+            </a:r>
+            <a:r>
+              <a:rPr lang="it-IT" err="1"/>
+              <a:t>Soup</a:t>
+            </a:r>
+            <a:r>
+              <a:rPr lang="it-IT"/>
+              <a:t> 4).</a:t>
+            </a:r>
+          </a:p>
+        </p:txBody>
+      </p:sp>
+      <p:sp>
+        <p:nvSpPr>
+          <p:cNvPr id="9" name="CasellaDiTesto 8">
+            <a:extLst>
+              <a:ext uri="{FF2B5EF4-FFF2-40B4-BE49-F238E27FC236}">
+                <a16:creationId xmlns:a16="http://schemas.microsoft.com/office/drawing/2014/main" id="{93667953-78BF-3292-2722-74F2087BEC22}"/>
+              </a:ext>
+            </a:extLst>
+          </p:cNvPr>
+          <p:cNvSpPr txBox="1"/>
+          <p:nvPr/>
+        </p:nvSpPr>
+        <p:spPr>
+          <a:xfrm>
+            <a:off x="359773" y="4653800"/>
+            <a:ext cx="3267347" cy="369332"/>
+          </a:xfrm>
+          <a:prstGeom prst="rect">
+            <a:avLst/>
+          </a:prstGeom>
+          <a:noFill/>
+        </p:spPr>
+        <p:txBody>
+          <a:bodyPr wrap="square" rtlCol="0">
+            <a:spAutoFit/>
+          </a:bodyPr>
+          <a:lstStyle/>
+          <a:p>
+            <a:r>
+              <a:rPr lang="it-IT" b="1"/>
+              <a:t>Data &amp; Analytics </a:t>
+            </a:r>
+            <a:r>
+              <a:rPr lang="it-IT" b="1" err="1"/>
+              <a:t>Visualization</a:t>
+            </a:r>
+            <a:r>
+              <a:rPr lang="it-IT"/>
+              <a:t>:</a:t>
+            </a:r>
+          </a:p>
+        </p:txBody>
+      </p:sp>
+      <p:pic>
+        <p:nvPicPr>
+          <p:cNvPr id="2058" name="Picture 10" descr="Grafana: visualizzazione dati open source | OVHcloud">
+            <a:extLst>
+              <a:ext uri="{FF2B5EF4-FFF2-40B4-BE49-F238E27FC236}">
+                <a16:creationId xmlns:a16="http://schemas.microsoft.com/office/drawing/2014/main" id="{9806E26C-895E-0FBB-4BD3-E230FCE07FF5}"/>
+              </a:ext>
+            </a:extLst>
+          </p:cNvPr>
+          <p:cNvPicPr>
+            <a:picLocks noChangeAspect="1" noChangeArrowheads="1"/>
+          </p:cNvPicPr>
+          <p:nvPr/>
+        </p:nvPicPr>
+        <p:blipFill>
+          <a:blip r:embed="rId4">
+            <a:extLst>
+              <a:ext uri="{28A0092B-C50C-407E-A947-70E740481C1C}">
+                <a14:useLocalDpi xmlns:a14="http://schemas.microsoft.com/office/drawing/2010/main" val="0"/>
+              </a:ext>
+            </a:extLst>
+          </a:blip>
+          <a:srcRect/>
+          <a:stretch>
+            <a:fillRect/>
+          </a:stretch>
+        </p:blipFill>
+        <p:spPr bwMode="auto">
+          <a:xfrm>
+            <a:off x="4921511" y="4258046"/>
+            <a:ext cx="2414547" cy="1160840"/>
+          </a:xfrm>
+          <a:prstGeom prst="rect">
+            <a:avLst/>
+          </a:prstGeom>
+          <a:noFill/>
+          <a:extLst>
+            <a:ext uri="{909E8E84-426E-40DD-AFC4-6F175D3DCCD1}">
+              <a14:hiddenFill xmlns:a14="http://schemas.microsoft.com/office/drawing/2010/main">
+                <a:solidFill>
+                  <a:srgbClr val="FFFFFF"/>
+                </a:solidFill>
+              </a14:hiddenFill>
+            </a:ext>
+          </a:extLst>
+        </p:spPr>
+      </p:pic>
+      <p:sp>
+        <p:nvSpPr>
+          <p:cNvPr id="10" name="CasellaDiTesto 9">
+            <a:extLst>
+              <a:ext uri="{FF2B5EF4-FFF2-40B4-BE49-F238E27FC236}">
+                <a16:creationId xmlns:a16="http://schemas.microsoft.com/office/drawing/2014/main" id="{76D51B25-A3C6-D479-060F-2EEEBCB247D7}"/>
+              </a:ext>
+            </a:extLst>
+          </p:cNvPr>
+          <p:cNvSpPr txBox="1"/>
+          <p:nvPr/>
+        </p:nvSpPr>
+        <p:spPr>
+          <a:xfrm>
+            <a:off x="359773" y="1233726"/>
+            <a:ext cx="8075568" cy="369332"/>
+          </a:xfrm>
+          <a:prstGeom prst="rect">
+            <a:avLst/>
+          </a:prstGeom>
+          <a:noFill/>
+        </p:spPr>
+        <p:txBody>
+          <a:bodyPr wrap="square" rtlCol="0">
+            <a:spAutoFit/>
+          </a:bodyPr>
+          <a:lstStyle/>
+          <a:p>
+            <a:r>
+              <a:rPr lang="en-US"/>
+              <a:t>The front-end will be offered through a Command Line Interface</a:t>
             </a:r>
           </a:p>
         </p:txBody>
@@ -5270,4 +6310,24 @@
   </a:objectDefaults>
   <a:extraClrSchemeLst/>
 </a:theme>
+</file>
+
+<file path=ppt/webextensions/taskpanes.xml><?xml version="1.0" encoding="utf-8"?>
+<wetp:taskpanes xmlns:wetp="http://schemas.microsoft.com/office/webextensions/taskpanes/2010/11">
+  <wetp:taskpane dockstate="right" visibility="0" width="350" row="0">
+    <wetp:webextensionref xmlns:r="http://schemas.openxmlformats.org/officeDocument/2006/relationships" r:id="rId1"/>
+  </wetp:taskpane>
+</wetp:taskpanes>
+</file>
+
+<file path=ppt/webextensions/webextension1.xml><?xml version="1.0" encoding="utf-8"?>
+<we:webextension xmlns:we="http://schemas.microsoft.com/office/webextensions/webextension/2010/11" id="{35233D9E-97B7-439F-9383-0CB9F0783E60}">
+  <we:reference id="wa200000113" version="1.0.0.0" store="it-IT" storeType="OMEX"/>
+  <we:alternateReferences>
+    <we:reference id="WA200000113" version="1.0.0.0" store="WA200000113" storeType="OMEX"/>
+  </we:alternateReferences>
+  <we:properties/>
+  <we:bindings/>
+  <we:snapshot xmlns:r="http://schemas.openxmlformats.org/officeDocument/2006/relationships"/>
+</we:webextension>
 </file>
</xml_diff>

<commit_message>
Added reviews text to presentation
</commit_message>
<xml_diff>
--- a/Preliminary Presentation.pptx
+++ b/Preliminary Presentation.pptx
@@ -136,8 +136,8 @@
 <file path=ppt/revisionInfo.xml><?xml version="1.0" encoding="utf-8"?>
 <p1510:revInfo xmlns:a="http://schemas.openxmlformats.org/drawingml/2006/main" xmlns:r="http://schemas.openxmlformats.org/officeDocument/2006/relationships" xmlns:p1510="http://schemas.microsoft.com/office/powerpoint/2015/10/main">
   <p1510:revLst>
-    <p1510:client id="{7E813D99-AEB3-4B76-BDCC-DFF4C8F531E4}" v="1260" dt="2023-12-10T16:23:33.526"/>
-    <p1510:client id="{C0DCF464-8A71-49F3-B299-0498C9951E1E}" v="233" dt="2023-12-10T17:09:33.963"/>
+    <p1510:client id="{7E813D99-AEB3-4B76-BDCC-DFF4C8F531E4}" v="1266" dt="2023-12-11T19:23:04.798"/>
+    <p1510:client id="{FBB22E37-8680-F705-B5D6-B35A14BA1DB5}" v="99" dt="2023-12-11T19:36:15.951"/>
   </p1510:revLst>
 </p1510:revInfo>
 </file>
@@ -224,7 +224,7 @@
           <a:p>
             <a:fld id="{0EF95162-6873-F647-B392-BF6A1F606277}" type="datetimeFigureOut">
               <a:rPr lang="it-IT" smtClean="0"/>
-              <a:t>10/12/2023</a:t>
+              <a:t>11/12/2023</a:t>
             </a:fld>
             <a:endParaRPr lang="it-IT"/>
           </a:p>
@@ -382,7 +382,7 @@
           <a:p>
             <a:fld id="{60FDF8BA-B6A2-CC4D-B552-37BF044E1040}" type="slidenum">
               <a:rPr lang="it-IT" smtClean="0"/>
-              <a:t>‹N›</a:t>
+              <a:t>‹#›</a:t>
             </a:fld>
             <a:endParaRPr lang="it-IT"/>
           </a:p>
@@ -491,6 +491,615 @@
 </p:notesMaster>
 </file>
 
+<file path=ppt/notesSlides/notesSlide1.xml><?xml version="1.0" encoding="utf-8"?>
+<p:notes xmlns:a="http://schemas.openxmlformats.org/drawingml/2006/main" xmlns:r="http://schemas.openxmlformats.org/officeDocument/2006/relationships" xmlns:p="http://schemas.openxmlformats.org/presentationml/2006/main">
+  <p:cSld>
+    <p:spTree>
+      <p:nvGrpSpPr>
+        <p:cNvPr id="1" name=""/>
+        <p:cNvGrpSpPr/>
+        <p:nvPr/>
+      </p:nvGrpSpPr>
+      <p:grpSpPr>
+        <a:xfrm>
+          <a:off x="0" y="0"/>
+          <a:ext cx="0" cy="0"/>
+          <a:chOff x="0" y="0"/>
+          <a:chExt cx="0" cy="0"/>
+        </a:xfrm>
+      </p:grpSpPr>
+      <p:sp>
+        <p:nvSpPr>
+          <p:cNvPr id="2" name="Segnaposto immagine diapositiva 1"/>
+          <p:cNvSpPr>
+            <a:spLocks noGrp="1" noRot="1" noChangeAspect="1"/>
+          </p:cNvSpPr>
+          <p:nvPr>
+            <p:ph type="sldImg"/>
+          </p:nvPr>
+        </p:nvSpPr>
+        <p:spPr/>
+      </p:sp>
+      <p:sp>
+        <p:nvSpPr>
+          <p:cNvPr id="3" name="Segnaposto note 2"/>
+          <p:cNvSpPr>
+            <a:spLocks noGrp="1"/>
+          </p:cNvSpPr>
+          <p:nvPr>
+            <p:ph type="body" idx="1"/>
+          </p:nvPr>
+        </p:nvSpPr>
+        <p:spPr/>
+        <p:txBody>
+          <a:bodyPr/>
+          <a:lstStyle/>
+          <a:p>
+            <a:r>
+              <a:rPr lang="it-IT" dirty="0"/>
+              <a:t>LC</a:t>
+            </a:r>
+          </a:p>
+        </p:txBody>
+      </p:sp>
+      <p:sp>
+        <p:nvSpPr>
+          <p:cNvPr id="4" name="Segnaposto numero diapositiva 3"/>
+          <p:cNvSpPr>
+            <a:spLocks noGrp="1"/>
+          </p:cNvSpPr>
+          <p:nvPr>
+            <p:ph type="sldNum" sz="quarter" idx="5"/>
+          </p:nvPr>
+        </p:nvSpPr>
+        <p:spPr/>
+        <p:txBody>
+          <a:bodyPr/>
+          <a:lstStyle/>
+          <a:p>
+            <a:fld id="{60FDF8BA-B6A2-CC4D-B552-37BF044E1040}" type="slidenum">
+              <a:rPr lang="it-IT" smtClean="0"/>
+              <a:t>2</a:t>
+            </a:fld>
+            <a:endParaRPr lang="it-IT"/>
+          </a:p>
+        </p:txBody>
+      </p:sp>
+    </p:spTree>
+    <p:extLst>
+      <p:ext uri="{BB962C8B-B14F-4D97-AF65-F5344CB8AC3E}">
+        <p14:creationId xmlns:p14="http://schemas.microsoft.com/office/powerpoint/2010/main" val="422863999"/>
+      </p:ext>
+    </p:extLst>
+  </p:cSld>
+  <p:clrMapOvr>
+    <a:masterClrMapping/>
+  </p:clrMapOvr>
+</p:notes>
+</file>
+
+<file path=ppt/notesSlides/notesSlide2.xml><?xml version="1.0" encoding="utf-8"?>
+<p:notes xmlns:a="http://schemas.openxmlformats.org/drawingml/2006/main" xmlns:r="http://schemas.openxmlformats.org/officeDocument/2006/relationships" xmlns:p="http://schemas.openxmlformats.org/presentationml/2006/main">
+  <p:cSld>
+    <p:spTree>
+      <p:nvGrpSpPr>
+        <p:cNvPr id="1" name=""/>
+        <p:cNvGrpSpPr/>
+        <p:nvPr/>
+      </p:nvGrpSpPr>
+      <p:grpSpPr>
+        <a:xfrm>
+          <a:off x="0" y="0"/>
+          <a:ext cx="0" cy="0"/>
+          <a:chOff x="0" y="0"/>
+          <a:chExt cx="0" cy="0"/>
+        </a:xfrm>
+      </p:grpSpPr>
+      <p:sp>
+        <p:nvSpPr>
+          <p:cNvPr id="2" name="Segnaposto immagine diapositiva 1"/>
+          <p:cNvSpPr>
+            <a:spLocks noGrp="1" noRot="1" noChangeAspect="1"/>
+          </p:cNvSpPr>
+          <p:nvPr>
+            <p:ph type="sldImg"/>
+          </p:nvPr>
+        </p:nvSpPr>
+        <p:spPr/>
+      </p:sp>
+      <p:sp>
+        <p:nvSpPr>
+          <p:cNvPr id="3" name="Segnaposto note 2"/>
+          <p:cNvSpPr>
+            <a:spLocks noGrp="1"/>
+          </p:cNvSpPr>
+          <p:nvPr>
+            <p:ph type="body" idx="1"/>
+          </p:nvPr>
+        </p:nvSpPr>
+        <p:spPr/>
+        <p:txBody>
+          <a:bodyPr/>
+          <a:lstStyle/>
+          <a:p>
+            <a:r>
+              <a:rPr lang="it-IT" dirty="0"/>
+              <a:t>LC</a:t>
+            </a:r>
+          </a:p>
+        </p:txBody>
+      </p:sp>
+      <p:sp>
+        <p:nvSpPr>
+          <p:cNvPr id="4" name="Segnaposto numero diapositiva 3"/>
+          <p:cNvSpPr>
+            <a:spLocks noGrp="1"/>
+          </p:cNvSpPr>
+          <p:nvPr>
+            <p:ph type="sldNum" sz="quarter" idx="5"/>
+          </p:nvPr>
+        </p:nvSpPr>
+        <p:spPr/>
+        <p:txBody>
+          <a:bodyPr/>
+          <a:lstStyle/>
+          <a:p>
+            <a:fld id="{60FDF8BA-B6A2-CC4D-B552-37BF044E1040}" type="slidenum">
+              <a:rPr lang="it-IT" smtClean="0"/>
+              <a:t>3</a:t>
+            </a:fld>
+            <a:endParaRPr lang="it-IT"/>
+          </a:p>
+        </p:txBody>
+      </p:sp>
+    </p:spTree>
+    <p:extLst>
+      <p:ext uri="{BB962C8B-B14F-4D97-AF65-F5344CB8AC3E}">
+        <p14:creationId xmlns:p14="http://schemas.microsoft.com/office/powerpoint/2010/main" val="1246103523"/>
+      </p:ext>
+    </p:extLst>
+  </p:cSld>
+  <p:clrMapOvr>
+    <a:masterClrMapping/>
+  </p:clrMapOvr>
+</p:notes>
+</file>
+
+<file path=ppt/notesSlides/notesSlide3.xml><?xml version="1.0" encoding="utf-8"?>
+<p:notes xmlns:a="http://schemas.openxmlformats.org/drawingml/2006/main" xmlns:r="http://schemas.openxmlformats.org/officeDocument/2006/relationships" xmlns:p="http://schemas.openxmlformats.org/presentationml/2006/main">
+  <p:cSld>
+    <p:spTree>
+      <p:nvGrpSpPr>
+        <p:cNvPr id="1" name=""/>
+        <p:cNvGrpSpPr/>
+        <p:nvPr/>
+      </p:nvGrpSpPr>
+      <p:grpSpPr>
+        <a:xfrm>
+          <a:off x="0" y="0"/>
+          <a:ext cx="0" cy="0"/>
+          <a:chOff x="0" y="0"/>
+          <a:chExt cx="0" cy="0"/>
+        </a:xfrm>
+      </p:grpSpPr>
+      <p:sp>
+        <p:nvSpPr>
+          <p:cNvPr id="2" name="Segnaposto immagine diapositiva 1"/>
+          <p:cNvSpPr>
+            <a:spLocks noGrp="1" noRot="1" noChangeAspect="1"/>
+          </p:cNvSpPr>
+          <p:nvPr>
+            <p:ph type="sldImg"/>
+          </p:nvPr>
+        </p:nvSpPr>
+        <p:spPr/>
+      </p:sp>
+      <p:sp>
+        <p:nvSpPr>
+          <p:cNvPr id="3" name="Segnaposto note 2"/>
+          <p:cNvSpPr>
+            <a:spLocks noGrp="1"/>
+          </p:cNvSpPr>
+          <p:nvPr>
+            <p:ph type="body" idx="1"/>
+          </p:nvPr>
+        </p:nvSpPr>
+        <p:spPr/>
+        <p:txBody>
+          <a:bodyPr/>
+          <a:lstStyle/>
+          <a:p>
+            <a:r>
+              <a:rPr lang="it-IT" dirty="0"/>
+              <a:t>NM</a:t>
+            </a:r>
+          </a:p>
+        </p:txBody>
+      </p:sp>
+      <p:sp>
+        <p:nvSpPr>
+          <p:cNvPr id="4" name="Segnaposto numero diapositiva 3"/>
+          <p:cNvSpPr>
+            <a:spLocks noGrp="1"/>
+          </p:cNvSpPr>
+          <p:nvPr>
+            <p:ph type="sldNum" sz="quarter" idx="5"/>
+          </p:nvPr>
+        </p:nvSpPr>
+        <p:spPr/>
+        <p:txBody>
+          <a:bodyPr/>
+          <a:lstStyle/>
+          <a:p>
+            <a:fld id="{60FDF8BA-B6A2-CC4D-B552-37BF044E1040}" type="slidenum">
+              <a:rPr lang="it-IT" smtClean="0"/>
+              <a:t>4</a:t>
+            </a:fld>
+            <a:endParaRPr lang="it-IT"/>
+          </a:p>
+        </p:txBody>
+      </p:sp>
+    </p:spTree>
+    <p:extLst>
+      <p:ext uri="{BB962C8B-B14F-4D97-AF65-F5344CB8AC3E}">
+        <p14:creationId xmlns:p14="http://schemas.microsoft.com/office/powerpoint/2010/main" val="867451202"/>
+      </p:ext>
+    </p:extLst>
+  </p:cSld>
+  <p:clrMapOvr>
+    <a:masterClrMapping/>
+  </p:clrMapOvr>
+</p:notes>
+</file>
+
+<file path=ppt/notesSlides/notesSlide4.xml><?xml version="1.0" encoding="utf-8"?>
+<p:notes xmlns:a="http://schemas.openxmlformats.org/drawingml/2006/main" xmlns:r="http://schemas.openxmlformats.org/officeDocument/2006/relationships" xmlns:p="http://schemas.openxmlformats.org/presentationml/2006/main">
+  <p:cSld>
+    <p:spTree>
+      <p:nvGrpSpPr>
+        <p:cNvPr id="1" name=""/>
+        <p:cNvGrpSpPr/>
+        <p:nvPr/>
+      </p:nvGrpSpPr>
+      <p:grpSpPr>
+        <a:xfrm>
+          <a:off x="0" y="0"/>
+          <a:ext cx="0" cy="0"/>
+          <a:chOff x="0" y="0"/>
+          <a:chExt cx="0" cy="0"/>
+        </a:xfrm>
+      </p:grpSpPr>
+      <p:sp>
+        <p:nvSpPr>
+          <p:cNvPr id="2" name="Segnaposto immagine diapositiva 1"/>
+          <p:cNvSpPr>
+            <a:spLocks noGrp="1" noRot="1" noChangeAspect="1"/>
+          </p:cNvSpPr>
+          <p:nvPr>
+            <p:ph type="sldImg"/>
+          </p:nvPr>
+        </p:nvSpPr>
+        <p:spPr/>
+      </p:sp>
+      <p:sp>
+        <p:nvSpPr>
+          <p:cNvPr id="3" name="Segnaposto note 2"/>
+          <p:cNvSpPr>
+            <a:spLocks noGrp="1"/>
+          </p:cNvSpPr>
+          <p:nvPr>
+            <p:ph type="body" idx="1"/>
+          </p:nvPr>
+        </p:nvSpPr>
+        <p:spPr/>
+        <p:txBody>
+          <a:bodyPr/>
+          <a:lstStyle/>
+          <a:p>
+            <a:r>
+              <a:rPr lang="it-IT" dirty="0"/>
+              <a:t>NM</a:t>
+            </a:r>
+          </a:p>
+        </p:txBody>
+      </p:sp>
+      <p:sp>
+        <p:nvSpPr>
+          <p:cNvPr id="4" name="Segnaposto numero diapositiva 3"/>
+          <p:cNvSpPr>
+            <a:spLocks noGrp="1"/>
+          </p:cNvSpPr>
+          <p:nvPr>
+            <p:ph type="sldNum" sz="quarter" idx="5"/>
+          </p:nvPr>
+        </p:nvSpPr>
+        <p:spPr/>
+        <p:txBody>
+          <a:bodyPr/>
+          <a:lstStyle/>
+          <a:p>
+            <a:fld id="{60FDF8BA-B6A2-CC4D-B552-37BF044E1040}" type="slidenum">
+              <a:rPr lang="it-IT" smtClean="0"/>
+              <a:t>5</a:t>
+            </a:fld>
+            <a:endParaRPr lang="it-IT"/>
+          </a:p>
+        </p:txBody>
+      </p:sp>
+    </p:spTree>
+    <p:extLst>
+      <p:ext uri="{BB962C8B-B14F-4D97-AF65-F5344CB8AC3E}">
+        <p14:creationId xmlns:p14="http://schemas.microsoft.com/office/powerpoint/2010/main" val="247172121"/>
+      </p:ext>
+    </p:extLst>
+  </p:cSld>
+  <p:clrMapOvr>
+    <a:masterClrMapping/>
+  </p:clrMapOvr>
+</p:notes>
+</file>
+
+<file path=ppt/notesSlides/notesSlide5.xml><?xml version="1.0" encoding="utf-8"?>
+<p:notes xmlns:a="http://schemas.openxmlformats.org/drawingml/2006/main" xmlns:r="http://schemas.openxmlformats.org/officeDocument/2006/relationships" xmlns:p="http://schemas.openxmlformats.org/presentationml/2006/main">
+  <p:cSld>
+    <p:spTree>
+      <p:nvGrpSpPr>
+        <p:cNvPr id="1" name=""/>
+        <p:cNvGrpSpPr/>
+        <p:nvPr/>
+      </p:nvGrpSpPr>
+      <p:grpSpPr>
+        <a:xfrm>
+          <a:off x="0" y="0"/>
+          <a:ext cx="0" cy="0"/>
+          <a:chOff x="0" y="0"/>
+          <a:chExt cx="0" cy="0"/>
+        </a:xfrm>
+      </p:grpSpPr>
+      <p:sp>
+        <p:nvSpPr>
+          <p:cNvPr id="2" name="Segnaposto immagine diapositiva 1"/>
+          <p:cNvSpPr>
+            <a:spLocks noGrp="1" noRot="1" noChangeAspect="1"/>
+          </p:cNvSpPr>
+          <p:nvPr>
+            <p:ph type="sldImg"/>
+          </p:nvPr>
+        </p:nvSpPr>
+        <p:spPr/>
+      </p:sp>
+      <p:sp>
+        <p:nvSpPr>
+          <p:cNvPr id="3" name="Segnaposto note 2"/>
+          <p:cNvSpPr>
+            <a:spLocks noGrp="1"/>
+          </p:cNvSpPr>
+          <p:nvPr>
+            <p:ph type="body" idx="1"/>
+          </p:nvPr>
+        </p:nvSpPr>
+        <p:spPr/>
+        <p:txBody>
+          <a:bodyPr/>
+          <a:lstStyle/>
+          <a:p>
+            <a:r>
+              <a:rPr lang="it-IT" dirty="0"/>
+              <a:t>CC</a:t>
+            </a:r>
+          </a:p>
+        </p:txBody>
+      </p:sp>
+      <p:sp>
+        <p:nvSpPr>
+          <p:cNvPr id="4" name="Segnaposto numero diapositiva 3"/>
+          <p:cNvSpPr>
+            <a:spLocks noGrp="1"/>
+          </p:cNvSpPr>
+          <p:nvPr>
+            <p:ph type="sldNum" sz="quarter" idx="5"/>
+          </p:nvPr>
+        </p:nvSpPr>
+        <p:spPr/>
+        <p:txBody>
+          <a:bodyPr/>
+          <a:lstStyle/>
+          <a:p>
+            <a:fld id="{60FDF8BA-B6A2-CC4D-B552-37BF044E1040}" type="slidenum">
+              <a:rPr lang="it-IT" smtClean="0"/>
+              <a:t>6</a:t>
+            </a:fld>
+            <a:endParaRPr lang="it-IT"/>
+          </a:p>
+        </p:txBody>
+      </p:sp>
+    </p:spTree>
+    <p:extLst>
+      <p:ext uri="{BB962C8B-B14F-4D97-AF65-F5344CB8AC3E}">
+        <p14:creationId xmlns:p14="http://schemas.microsoft.com/office/powerpoint/2010/main" val="2643742203"/>
+      </p:ext>
+    </p:extLst>
+  </p:cSld>
+  <p:clrMapOvr>
+    <a:masterClrMapping/>
+  </p:clrMapOvr>
+</p:notes>
+</file>
+
+<file path=ppt/notesSlides/notesSlide6.xml><?xml version="1.0" encoding="utf-8"?>
+<p:notes xmlns:a="http://schemas.openxmlformats.org/drawingml/2006/main" xmlns:r="http://schemas.openxmlformats.org/officeDocument/2006/relationships" xmlns:p="http://schemas.openxmlformats.org/presentationml/2006/main">
+  <p:cSld>
+    <p:spTree>
+      <p:nvGrpSpPr>
+        <p:cNvPr id="1" name=""/>
+        <p:cNvGrpSpPr/>
+        <p:nvPr/>
+      </p:nvGrpSpPr>
+      <p:grpSpPr>
+        <a:xfrm>
+          <a:off x="0" y="0"/>
+          <a:ext cx="0" cy="0"/>
+          <a:chOff x="0" y="0"/>
+          <a:chExt cx="0" cy="0"/>
+        </a:xfrm>
+      </p:grpSpPr>
+      <p:sp>
+        <p:nvSpPr>
+          <p:cNvPr id="2" name="Segnaposto immagine diapositiva 1"/>
+          <p:cNvSpPr>
+            <a:spLocks noGrp="1" noRot="1" noChangeAspect="1"/>
+          </p:cNvSpPr>
+          <p:nvPr>
+            <p:ph type="sldImg"/>
+          </p:nvPr>
+        </p:nvSpPr>
+        <p:spPr/>
+      </p:sp>
+      <p:sp>
+        <p:nvSpPr>
+          <p:cNvPr id="3" name="Segnaposto note 2"/>
+          <p:cNvSpPr>
+            <a:spLocks noGrp="1"/>
+          </p:cNvSpPr>
+          <p:nvPr>
+            <p:ph type="body" idx="1"/>
+          </p:nvPr>
+        </p:nvSpPr>
+        <p:spPr/>
+        <p:txBody>
+          <a:bodyPr/>
+          <a:lstStyle/>
+          <a:p>
+            <a:r>
+              <a:rPr lang="it-IT" dirty="0"/>
+              <a:t>CC</a:t>
+            </a:r>
+          </a:p>
+        </p:txBody>
+      </p:sp>
+      <p:sp>
+        <p:nvSpPr>
+          <p:cNvPr id="4" name="Segnaposto numero diapositiva 3"/>
+          <p:cNvSpPr>
+            <a:spLocks noGrp="1"/>
+          </p:cNvSpPr>
+          <p:nvPr>
+            <p:ph type="sldNum" sz="quarter" idx="5"/>
+          </p:nvPr>
+        </p:nvSpPr>
+        <p:spPr/>
+        <p:txBody>
+          <a:bodyPr/>
+          <a:lstStyle/>
+          <a:p>
+            <a:fld id="{60FDF8BA-B6A2-CC4D-B552-37BF044E1040}" type="slidenum">
+              <a:rPr lang="it-IT" smtClean="0"/>
+              <a:t>7</a:t>
+            </a:fld>
+            <a:endParaRPr lang="it-IT"/>
+          </a:p>
+        </p:txBody>
+      </p:sp>
+    </p:spTree>
+    <p:extLst>
+      <p:ext uri="{BB962C8B-B14F-4D97-AF65-F5344CB8AC3E}">
+        <p14:creationId xmlns:p14="http://schemas.microsoft.com/office/powerpoint/2010/main" val="1925806096"/>
+      </p:ext>
+    </p:extLst>
+  </p:cSld>
+  <p:clrMapOvr>
+    <a:masterClrMapping/>
+  </p:clrMapOvr>
+</p:notes>
+</file>
+
+<file path=ppt/notesSlides/notesSlide7.xml><?xml version="1.0" encoding="utf-8"?>
+<p:notes xmlns:a="http://schemas.openxmlformats.org/drawingml/2006/main" xmlns:r="http://schemas.openxmlformats.org/officeDocument/2006/relationships" xmlns:p="http://schemas.openxmlformats.org/presentationml/2006/main">
+  <p:cSld>
+    <p:spTree>
+      <p:nvGrpSpPr>
+        <p:cNvPr id="1" name=""/>
+        <p:cNvGrpSpPr/>
+        <p:nvPr/>
+      </p:nvGrpSpPr>
+      <p:grpSpPr>
+        <a:xfrm>
+          <a:off x="0" y="0"/>
+          <a:ext cx="0" cy="0"/>
+          <a:chOff x="0" y="0"/>
+          <a:chExt cx="0" cy="0"/>
+        </a:xfrm>
+      </p:grpSpPr>
+      <p:sp>
+        <p:nvSpPr>
+          <p:cNvPr id="2" name="Segnaposto immagine diapositiva 1"/>
+          <p:cNvSpPr>
+            <a:spLocks noGrp="1" noRot="1" noChangeAspect="1"/>
+          </p:cNvSpPr>
+          <p:nvPr>
+            <p:ph type="sldImg"/>
+          </p:nvPr>
+        </p:nvSpPr>
+        <p:spPr/>
+      </p:sp>
+      <p:sp>
+        <p:nvSpPr>
+          <p:cNvPr id="3" name="Segnaposto note 2"/>
+          <p:cNvSpPr>
+            <a:spLocks noGrp="1"/>
+          </p:cNvSpPr>
+          <p:nvPr>
+            <p:ph type="body" idx="1"/>
+          </p:nvPr>
+        </p:nvSpPr>
+        <p:spPr/>
+        <p:txBody>
+          <a:bodyPr/>
+          <a:lstStyle/>
+          <a:p>
+            <a:r>
+              <a:rPr lang="it-IT" dirty="0"/>
+              <a:t>CC</a:t>
+            </a:r>
+          </a:p>
+        </p:txBody>
+      </p:sp>
+      <p:sp>
+        <p:nvSpPr>
+          <p:cNvPr id="4" name="Segnaposto numero diapositiva 3"/>
+          <p:cNvSpPr>
+            <a:spLocks noGrp="1"/>
+          </p:cNvSpPr>
+          <p:nvPr>
+            <p:ph type="sldNum" sz="quarter" idx="5"/>
+          </p:nvPr>
+        </p:nvSpPr>
+        <p:spPr/>
+        <p:txBody>
+          <a:bodyPr/>
+          <a:lstStyle/>
+          <a:p>
+            <a:fld id="{60FDF8BA-B6A2-CC4D-B552-37BF044E1040}" type="slidenum">
+              <a:rPr lang="it-IT" smtClean="0"/>
+              <a:t>8</a:t>
+            </a:fld>
+            <a:endParaRPr lang="it-IT"/>
+          </a:p>
+        </p:txBody>
+      </p:sp>
+    </p:spTree>
+    <p:extLst>
+      <p:ext uri="{BB962C8B-B14F-4D97-AF65-F5344CB8AC3E}">
+        <p14:creationId xmlns:p14="http://schemas.microsoft.com/office/powerpoint/2010/main" val="7937889"/>
+      </p:ext>
+    </p:extLst>
+  </p:cSld>
+  <p:clrMapOvr>
+    <a:masterClrMapping/>
+  </p:clrMapOvr>
+</p:notes>
+</file>
+
 <file path=ppt/slideLayouts/slideLayout1.xml><?xml version="1.0" encoding="utf-8"?>
 <p:sldLayout xmlns:a="http://schemas.openxmlformats.org/drawingml/2006/main" xmlns:r="http://schemas.openxmlformats.org/officeDocument/2006/relationships" xmlns:p="http://schemas.openxmlformats.org/presentationml/2006/main" type="title" preserve="1">
   <p:cSld name="Diapositiva titolo">
@@ -678,7 +1287,7 @@
           <a:p>
             <a:fld id="{2FDCBEE4-315A-8E42-835E-29A1DAE07625}" type="datetimeFigureOut">
               <a:rPr lang="it-IT" smtClean="0"/>
-              <a:t>10/12/2023</a:t>
+              <a:t>11/12/2023</a:t>
             </a:fld>
             <a:endParaRPr lang="it-IT"/>
           </a:p>
@@ -736,7 +1345,7 @@
           <a:p>
             <a:fld id="{F3EAF9BD-73C2-C944-967F-16A9AD6CE362}" type="slidenum">
               <a:rPr lang="it-IT" smtClean="0"/>
-              <a:t>‹N›</a:t>
+              <a:t>‹#›</a:t>
             </a:fld>
             <a:endParaRPr lang="it-IT"/>
           </a:p>
@@ -870,7 +1479,7 @@
           <a:p>
             <a:fld id="{2FDCBEE4-315A-8E42-835E-29A1DAE07625}" type="datetimeFigureOut">
               <a:rPr lang="it-IT" smtClean="0"/>
-              <a:t>10/12/2023</a:t>
+              <a:t>11/12/2023</a:t>
             </a:fld>
             <a:endParaRPr lang="it-IT"/>
           </a:p>
@@ -928,7 +1537,7 @@
           <a:p>
             <a:fld id="{F3EAF9BD-73C2-C944-967F-16A9AD6CE362}" type="slidenum">
               <a:rPr lang="it-IT" smtClean="0"/>
-              <a:t>‹N›</a:t>
+              <a:t>‹#›</a:t>
             </a:fld>
             <a:endParaRPr lang="it-IT"/>
           </a:p>
@@ -1072,7 +1681,7 @@
           <a:p>
             <a:fld id="{2FDCBEE4-315A-8E42-835E-29A1DAE07625}" type="datetimeFigureOut">
               <a:rPr lang="it-IT" smtClean="0"/>
-              <a:t>10/12/2023</a:t>
+              <a:t>11/12/2023</a:t>
             </a:fld>
             <a:endParaRPr lang="it-IT"/>
           </a:p>
@@ -1130,7 +1739,7 @@
           <a:p>
             <a:fld id="{F3EAF9BD-73C2-C944-967F-16A9AD6CE362}" type="slidenum">
               <a:rPr lang="it-IT" smtClean="0"/>
-              <a:t>‹N›</a:t>
+              <a:t>‹#›</a:t>
             </a:fld>
             <a:endParaRPr lang="it-IT"/>
           </a:p>
@@ -1264,7 +1873,7 @@
           <a:p>
             <a:fld id="{2FDCBEE4-315A-8E42-835E-29A1DAE07625}" type="datetimeFigureOut">
               <a:rPr lang="it-IT" smtClean="0"/>
-              <a:t>10/12/2023</a:t>
+              <a:t>11/12/2023</a:t>
             </a:fld>
             <a:endParaRPr lang="it-IT"/>
           </a:p>
@@ -1322,7 +1931,7 @@
           <a:p>
             <a:fld id="{F3EAF9BD-73C2-C944-967F-16A9AD6CE362}" type="slidenum">
               <a:rPr lang="it-IT" smtClean="0"/>
-              <a:t>‹N›</a:t>
+              <a:t>‹#›</a:t>
             </a:fld>
             <a:endParaRPr lang="it-IT"/>
           </a:p>
@@ -1533,7 +2142,7 @@
           <a:p>
             <a:fld id="{2FDCBEE4-315A-8E42-835E-29A1DAE07625}" type="datetimeFigureOut">
               <a:rPr lang="it-IT" smtClean="0"/>
-              <a:t>10/12/2023</a:t>
+              <a:t>11/12/2023</a:t>
             </a:fld>
             <a:endParaRPr lang="it-IT"/>
           </a:p>
@@ -1591,7 +2200,7 @@
           <a:p>
             <a:fld id="{F3EAF9BD-73C2-C944-967F-16A9AD6CE362}" type="slidenum">
               <a:rPr lang="it-IT" smtClean="0"/>
-              <a:t>‹N›</a:t>
+              <a:t>‹#›</a:t>
             </a:fld>
             <a:endParaRPr lang="it-IT"/>
           </a:p>
@@ -1842,7 +2451,7 @@
           <a:p>
             <a:fld id="{2FDCBEE4-315A-8E42-835E-29A1DAE07625}" type="datetimeFigureOut">
               <a:rPr lang="it-IT" smtClean="0"/>
-              <a:t>10/12/2023</a:t>
+              <a:t>11/12/2023</a:t>
             </a:fld>
             <a:endParaRPr lang="it-IT"/>
           </a:p>
@@ -1900,7 +2509,7 @@
           <a:p>
             <a:fld id="{F3EAF9BD-73C2-C944-967F-16A9AD6CE362}" type="slidenum">
               <a:rPr lang="it-IT" smtClean="0"/>
-              <a:t>‹N›</a:t>
+              <a:t>‹#›</a:t>
             </a:fld>
             <a:endParaRPr lang="it-IT"/>
           </a:p>
@@ -2285,7 +2894,7 @@
           <a:p>
             <a:fld id="{2FDCBEE4-315A-8E42-835E-29A1DAE07625}" type="datetimeFigureOut">
               <a:rPr lang="it-IT" smtClean="0"/>
-              <a:t>10/12/2023</a:t>
+              <a:t>11/12/2023</a:t>
             </a:fld>
             <a:endParaRPr lang="it-IT"/>
           </a:p>
@@ -2343,7 +2952,7 @@
           <a:p>
             <a:fld id="{F3EAF9BD-73C2-C944-967F-16A9AD6CE362}" type="slidenum">
               <a:rPr lang="it-IT" smtClean="0"/>
-              <a:t>‹N›</a:t>
+              <a:t>‹#›</a:t>
             </a:fld>
             <a:endParaRPr lang="it-IT"/>
           </a:p>
@@ -2426,7 +3035,7 @@
           <a:p>
             <a:fld id="{2FDCBEE4-315A-8E42-835E-29A1DAE07625}" type="datetimeFigureOut">
               <a:rPr lang="it-IT" smtClean="0"/>
-              <a:t>10/12/2023</a:t>
+              <a:t>11/12/2023</a:t>
             </a:fld>
             <a:endParaRPr lang="it-IT"/>
           </a:p>
@@ -2484,7 +3093,7 @@
           <a:p>
             <a:fld id="{F3EAF9BD-73C2-C944-967F-16A9AD6CE362}" type="slidenum">
               <a:rPr lang="it-IT" smtClean="0"/>
-              <a:t>‹N›</a:t>
+              <a:t>‹#›</a:t>
             </a:fld>
             <a:endParaRPr lang="it-IT"/>
           </a:p>
@@ -2545,7 +3154,7 @@
           <a:p>
             <a:fld id="{2FDCBEE4-315A-8E42-835E-29A1DAE07625}" type="datetimeFigureOut">
               <a:rPr lang="it-IT" smtClean="0"/>
-              <a:t>10/12/2023</a:t>
+              <a:t>11/12/2023</a:t>
             </a:fld>
             <a:endParaRPr lang="it-IT"/>
           </a:p>
@@ -2603,7 +3212,7 @@
           <a:p>
             <a:fld id="{F3EAF9BD-73C2-C944-967F-16A9AD6CE362}" type="slidenum">
               <a:rPr lang="it-IT" smtClean="0"/>
-              <a:t>‹N›</a:t>
+              <a:t>‹#›</a:t>
             </a:fld>
             <a:endParaRPr lang="it-IT"/>
           </a:p>
@@ -2844,7 +3453,7 @@
           <a:p>
             <a:fld id="{2FDCBEE4-315A-8E42-835E-29A1DAE07625}" type="datetimeFigureOut">
               <a:rPr lang="it-IT" smtClean="0"/>
-              <a:t>10/12/2023</a:t>
+              <a:t>11/12/2023</a:t>
             </a:fld>
             <a:endParaRPr lang="it-IT"/>
           </a:p>
@@ -2902,7 +3511,7 @@
           <a:p>
             <a:fld id="{F3EAF9BD-73C2-C944-967F-16A9AD6CE362}" type="slidenum">
               <a:rPr lang="it-IT" smtClean="0"/>
-              <a:t>‹N›</a:t>
+              <a:t>‹#›</a:t>
             </a:fld>
             <a:endParaRPr lang="it-IT"/>
           </a:p>
@@ -3120,7 +3729,7 @@
           <a:p>
             <a:fld id="{2FDCBEE4-315A-8E42-835E-29A1DAE07625}" type="datetimeFigureOut">
               <a:rPr lang="it-IT" smtClean="0"/>
-              <a:t>10/12/2023</a:t>
+              <a:t>11/12/2023</a:t>
             </a:fld>
             <a:endParaRPr lang="it-IT"/>
           </a:p>
@@ -3178,7 +3787,7 @@
           <a:p>
             <a:fld id="{F3EAF9BD-73C2-C944-967F-16A9AD6CE362}" type="slidenum">
               <a:rPr lang="it-IT" smtClean="0"/>
-              <a:t>‹N›</a:t>
+              <a:t>‹#›</a:t>
             </a:fld>
             <a:endParaRPr lang="it-IT"/>
           </a:p>
@@ -3936,7 +4545,7 @@
         <p:spPr>
           <a:xfrm>
             <a:off x="391689" y="1289956"/>
-            <a:ext cx="8343900" cy="4524315"/>
+            <a:ext cx="8343900" cy="5355312"/>
           </a:xfrm>
           <a:prstGeom prst="rect">
             <a:avLst/>
@@ -3944,7 +4553,7 @@
           <a:noFill/>
         </p:spPr>
         <p:txBody>
-          <a:bodyPr wrap="square" rtlCol="0">
+          <a:bodyPr wrap="square" lIns="91440" tIns="45720" rIns="91440" bIns="45720" rtlCol="0" anchor="t">
             <a:spAutoFit/>
           </a:bodyPr>
           <a:lstStyle/>
@@ -3955,7 +4564,7 @@
               </a:lnSpc>
             </a:pPr>
             <a:r>
-              <a:rPr lang="en-US"/>
+              <a:rPr lang="en-US" dirty="0"/>
               <a:t>The application is useful for:</a:t>
             </a:r>
           </a:p>
@@ -3968,11 +4577,11 @@
               <a:buChar char="•"/>
             </a:pPr>
             <a:r>
-              <a:rPr lang="en-US" b="1"/>
+              <a:rPr lang="en-US" b="1" dirty="0"/>
               <a:t>Manage your game collection</a:t>
             </a:r>
             <a:r>
-              <a:rPr lang="en-US"/>
+              <a:rPr lang="en-US" dirty="0"/>
               <a:t>:</a:t>
             </a:r>
           </a:p>
@@ -3985,7 +4594,7 @@
               <a:buChar char="•"/>
             </a:pPr>
             <a:r>
-              <a:rPr lang="en-US"/>
+              <a:rPr lang="en-US" dirty="0"/>
               <a:t>Keeping track of your videogame library and add new games with ease</a:t>
             </a:r>
           </a:p>
@@ -3998,11 +4607,11 @@
               <a:buChar char="•"/>
             </a:pPr>
             <a:r>
-              <a:rPr lang="en-US" b="1"/>
+              <a:rPr lang="en-US" b="1" dirty="0"/>
               <a:t>Wishlist</a:t>
             </a:r>
             <a:r>
-              <a:rPr lang="en-US"/>
+              <a:rPr lang="en-US" dirty="0"/>
               <a:t>:</a:t>
             </a:r>
           </a:p>
@@ -4015,7 +4624,7 @@
               <a:buChar char="•"/>
             </a:pPr>
             <a:r>
-              <a:rPr lang="en-US"/>
+              <a:rPr lang="en-US" dirty="0"/>
               <a:t>Add games to your wishlist to keep track to the titles you want to play next filtering by platform, genre or release date</a:t>
             </a:r>
           </a:p>
@@ -4028,12 +4637,8 @@
               <a:buChar char="•"/>
             </a:pPr>
             <a:r>
-              <a:rPr lang="en-US" b="1"/>
-              <a:t>Hall of fame</a:t>
-            </a:r>
-            <a:r>
-              <a:rPr lang="en-US"/>
-              <a:t>:</a:t>
+              <a:rPr lang="en-US" b="1" dirty="0"/>
+              <a:t>Reviews:</a:t>
             </a:r>
           </a:p>
           <a:p>
@@ -4045,9 +4650,12 @@
               <a:buChar char="•"/>
             </a:pPr>
             <a:r>
-              <a:rPr lang="en-US"/>
-              <a:t>Track your trophies and achievements</a:t>
-            </a:r>
+              <a:rPr lang="en-US" dirty="0">
+                <a:cs typeface="Calibri"/>
+              </a:rPr>
+              <a:t>Share gaming experiences through detailed reviews and rate others' reviews to highlight the most helpful ones</a:t>
+            </a:r>
+            <a:endParaRPr lang="en-US" b="1" dirty="0"/>
           </a:p>
           <a:p>
             <a:pPr marL="285750" indent="-285750">
@@ -4058,11 +4666,11 @@
               <a:buChar char="•"/>
             </a:pPr>
             <a:r>
-              <a:rPr lang="en-US" b="1"/>
+              <a:rPr lang="en-US" b="1" dirty="0"/>
               <a:t>Join the gaming community</a:t>
             </a:r>
             <a:r>
-              <a:rPr lang="en-US"/>
+              <a:rPr lang="en-US" dirty="0"/>
               <a:t>:</a:t>
             </a:r>
           </a:p>
@@ -4075,12 +4683,22 @@
               <a:buChar char="•"/>
             </a:pPr>
             <a:r>
-              <a:rPr lang="en-US"/>
+              <a:rPr lang="en-US" dirty="0"/>
               <a:t>Connect with other players, share rating and reviews and follow their activities</a:t>
             </a:r>
           </a:p>
           <a:p>
-            <a:endParaRPr lang="en-US" i="1"/>
+            <a:pPr marL="285750" indent="-285750">
+              <a:lnSpc>
+                <a:spcPct val="150000"/>
+              </a:lnSpc>
+              <a:buFont typeface="Arial" panose="020B0604020202020204" pitchFamily="34" charset="0"/>
+              <a:buChar char="•"/>
+            </a:pPr>
+            <a:endParaRPr lang="en-US" b="1" dirty="0"/>
+          </a:p>
+          <a:p>
+            <a:endParaRPr lang="en-US" i="1" dirty="0"/>
           </a:p>
         </p:txBody>
       </p:sp>
@@ -4146,10 +4764,10 @@
       </p:sp>
       <p:pic>
         <p:nvPicPr>
-          <p:cNvPr id="21" name="Immagine 20" descr="Immagine che contiene testo, schermata, cerchio, Carattere&#10;&#10;Descrizione generata automaticamente">
+          <p:cNvPr id="4" name="Immagine 3" descr="Immagine che contiene schermata, testo, cerchio, design&#10;&#10;Descrizione generata automaticamente">
             <a:extLst>
               <a:ext uri="{FF2B5EF4-FFF2-40B4-BE49-F238E27FC236}">
-                <a16:creationId xmlns:a16="http://schemas.microsoft.com/office/drawing/2014/main" id="{2536A74A-270C-7252-0F0D-859DED1CB262}"/>
+                <a16:creationId xmlns:a16="http://schemas.microsoft.com/office/drawing/2014/main" id="{E19646BC-9FBF-809B-F7D1-FF8A7DCEAD96}"/>
               </a:ext>
             </a:extLst>
           </p:cNvPr>
@@ -4159,15 +4777,15 @@
           <p:nvPr/>
         </p:nvPicPr>
         <p:blipFill>
-          <a:blip r:embed="rId2"/>
+          <a:blip r:embed="rId3"/>
           <a:stretch>
             <a:fillRect/>
           </a:stretch>
         </p:blipFill>
         <p:spPr>
           <a:xfrm>
-            <a:off x="1048914" y="1441960"/>
-            <a:ext cx="7029450" cy="4562475"/>
+            <a:off x="864319" y="1233093"/>
+            <a:ext cx="7200689" cy="4870176"/>
           </a:xfrm>
           <a:prstGeom prst="rect">
             <a:avLst/>
@@ -4226,7 +4844,7 @@
           <a:lstStyle/>
           <a:p>
             <a:r>
-              <a:rPr lang="en-US"/>
+              <a:rPr lang="en-US" dirty="0"/>
               <a:t>Dataset Description</a:t>
             </a:r>
           </a:p>
@@ -4246,8 +4864,8 @@
         </p:nvSpPr>
         <p:spPr>
           <a:xfrm>
-            <a:off x="397485" y="1642016"/>
-            <a:ext cx="8349029" cy="3170099"/>
+            <a:off x="390419" y="1233094"/>
+            <a:ext cx="8356096" cy="4616648"/>
           </a:xfrm>
           <a:prstGeom prst="rect">
             <a:avLst/>
@@ -4262,68 +4880,235 @@
           <a:p>
             <a:pPr lvl="0"/>
             <a:r>
-              <a:rPr lang="en-US" sz="2000" b="1" i="1"/>
-              <a:t>Source:</a:t>
-            </a:r>
+              <a:rPr lang="en-US" sz="2000" b="1" i="1" dirty="0"/>
+              <a:t>Source: </a:t>
+            </a:r>
+            <a:r>
+              <a:rPr lang="en-US" sz="2000" dirty="0">
+                <a:hlinkClick r:id="rId3"/>
+              </a:rPr>
+              <a:t>IGDB.com</a:t>
+            </a:r>
+            <a:r>
+              <a:rPr lang="en-US" sz="2000" dirty="0"/>
+              <a:t>, </a:t>
+            </a:r>
+            <a:r>
+              <a:rPr lang="en-US" sz="2000" dirty="0">
+                <a:hlinkClick r:id="rId4"/>
+              </a:rPr>
+              <a:t>Steam</a:t>
+            </a:r>
+            <a:endParaRPr lang="en-US" sz="2000" b="1" i="1" dirty="0"/>
           </a:p>
           <a:p>
             <a:pPr lvl="0"/>
-            <a:endParaRPr lang="en-US" sz="2000" b="1" i="1"/>
+            <a:endParaRPr lang="en-US" sz="2000" b="1" i="1" dirty="0"/>
           </a:p>
           <a:p>
             <a:pPr lvl="0"/>
             <a:r>
-              <a:rPr lang="en-US" sz="2000" b="1" i="1"/>
+              <a:rPr lang="en-US" sz="2000" b="1" i="1" dirty="0"/>
               <a:t>Description:</a:t>
             </a:r>
           </a:p>
           <a:p>
+            <a:pPr marL="800100" lvl="1" indent="-342900">
+              <a:buFont typeface="Arial" panose="020B0604020202020204" pitchFamily="34" charset="0"/>
+              <a:buChar char="•"/>
+            </a:pPr>
+            <a:r>
+              <a:rPr lang="en-US" dirty="0" err="1"/>
+              <a:t>IGDB.com</a:t>
+            </a:r>
+            <a:r>
+              <a:rPr lang="en-US" dirty="0"/>
+              <a:t> is a video games database with an API for developers</a:t>
+            </a:r>
+          </a:p>
+          <a:p>
+            <a:pPr marL="800100" lvl="1" indent="-342900">
+              <a:buFont typeface="Arial" panose="020B0604020202020204" pitchFamily="34" charset="0"/>
+              <a:buChar char="•"/>
+            </a:pPr>
+            <a:r>
+              <a:rPr lang="en-US" dirty="0"/>
+              <a:t>Steam is a leading digital distribution service for video games. Web scraping techniques were used to extract authentic reviews from their storefront.</a:t>
+            </a:r>
+            <a:endParaRPr lang="en-US" b="1" i="1" dirty="0"/>
+          </a:p>
+          <a:p>
+            <a:pPr marL="800100" lvl="1" indent="-342900">
+              <a:buFont typeface="Arial" panose="020B0604020202020204" pitchFamily="34" charset="0"/>
+              <a:buChar char="•"/>
+            </a:pPr>
+            <a:endParaRPr lang="en-US" sz="2000" b="1" i="1" dirty="0"/>
+          </a:p>
+          <a:p>
             <a:pPr lvl="0"/>
-            <a:endParaRPr lang="en-US" sz="2000" b="1" i="1"/>
+            <a:r>
+              <a:rPr lang="en-US" sz="2000" b="1" i="1" dirty="0"/>
+              <a:t>Volume: </a:t>
+            </a:r>
+            <a:r>
+              <a:rPr lang="en-US" dirty="0"/>
+              <a:t>about 850 MB, more specifically:</a:t>
+            </a:r>
+          </a:p>
+          <a:p>
+            <a:pPr marL="800100" lvl="1" indent="-342900">
+              <a:buFont typeface="Arial" panose="020B0604020202020204" pitchFamily="34" charset="0"/>
+              <a:buChar char="•"/>
+            </a:pPr>
+            <a:r>
+              <a:rPr lang="en-US" dirty="0"/>
+              <a:t>Over 250K video games</a:t>
+            </a:r>
+          </a:p>
+          <a:p>
+            <a:pPr marL="800100" lvl="1" indent="-342900">
+              <a:buFont typeface="Arial" panose="020B0604020202020204" pitchFamily="34" charset="0"/>
+              <a:buChar char="•"/>
+            </a:pPr>
+            <a:r>
+              <a:rPr lang="en-US" dirty="0"/>
+              <a:t>Over 500K reviews</a:t>
+            </a:r>
           </a:p>
           <a:p>
             <a:pPr lvl="0"/>
-            <a:r>
-              <a:rPr lang="en-US" sz="2000" b="1" i="1"/>
-              <a:t>Volume:</a:t>
-            </a:r>
+            <a:endParaRPr lang="en-US" sz="2000" b="1" i="1" dirty="0"/>
           </a:p>
           <a:p>
             <a:pPr lvl="0"/>
-            <a:endParaRPr lang="en-US" sz="2000" b="1" i="1"/>
+            <a:r>
+              <a:rPr lang="en-US" sz="2000" b="1" i="1" dirty="0"/>
+              <a:t>Variety</a:t>
+            </a:r>
+            <a:r>
+              <a:rPr lang="en-US" sz="2000" dirty="0"/>
+              <a:t>: </a:t>
+            </a:r>
+            <a:r>
+              <a:rPr lang="en-US" dirty="0"/>
+              <a:t>Video games data was obtained by cross-referencing Steam and IGDB</a:t>
+            </a:r>
           </a:p>
           <a:p>
             <a:pPr lvl="0"/>
-            <a:r>
-              <a:rPr lang="en-US" sz="2000" b="1" i="1"/>
-              <a:t>Variety</a:t>
-            </a:r>
-            <a:r>
-              <a:rPr lang="en-US" sz="2000"/>
-              <a:t>: </a:t>
-            </a:r>
+            <a:endParaRPr lang="en-US" sz="2000" b="1" i="1" dirty="0"/>
           </a:p>
           <a:p>
             <a:pPr lvl="0"/>
-            <a:endParaRPr lang="en-US" sz="2000" b="1" i="1"/>
-          </a:p>
-          <a:p>
-            <a:pPr lvl="0"/>
-            <a:r>
-              <a:rPr lang="en-US" sz="2000" b="1" i="1"/>
+            <a:r>
+              <a:rPr lang="en-US" sz="2000" b="1" i="1" dirty="0"/>
               <a:t>Velocity/Variability</a:t>
             </a:r>
             <a:r>
-              <a:rPr lang="en-US" sz="2000"/>
-              <a:t>:</a:t>
-            </a:r>
-            <a:endParaRPr lang="it-IT" sz="2000"/>
-          </a:p>
-          <a:p>
-            <a:endParaRPr lang="en-US" sz="2000"/>
-          </a:p>
-        </p:txBody>
-      </p:sp>
+              <a:rPr lang="en-US" sz="2000" dirty="0"/>
+              <a:t>: N/A</a:t>
+            </a:r>
+            <a:endParaRPr lang="it-IT" sz="2000" dirty="0"/>
+          </a:p>
+          <a:p>
+            <a:endParaRPr lang="en-US" sz="2000" dirty="0"/>
+          </a:p>
+        </p:txBody>
+      </p:sp>
+      <p:pic>
+        <p:nvPicPr>
+          <p:cNvPr id="1026" name="Picture 2">
+            <a:extLst>
+              <a:ext uri="{FF2B5EF4-FFF2-40B4-BE49-F238E27FC236}">
+                <a16:creationId xmlns:a16="http://schemas.microsoft.com/office/drawing/2014/main" id="{D197D3BF-5343-B07E-60F7-3F50E52EFD3A}"/>
+              </a:ext>
+            </a:extLst>
+          </p:cNvPr>
+          <p:cNvPicPr>
+            <a:picLocks noChangeAspect="1" noChangeArrowheads="1"/>
+          </p:cNvPicPr>
+          <p:nvPr/>
+        </p:nvPicPr>
+        <p:blipFill>
+          <a:blip r:embed="rId5">
+            <a:extLst>
+              <a:ext uri="{28A0092B-C50C-407E-A947-70E740481C1C}">
+                <a14:useLocalDpi xmlns:a14="http://schemas.microsoft.com/office/drawing/2010/main" val="0"/>
+              </a:ext>
+            </a:extLst>
+          </a:blip>
+          <a:srcRect/>
+          <a:stretch>
+            <a:fillRect/>
+          </a:stretch>
+        </p:blipFill>
+        <p:spPr bwMode="auto">
+          <a:xfrm>
+            <a:off x="4900775" y="1233093"/>
+            <a:ext cx="1458930" cy="702110"/>
+          </a:xfrm>
+          <a:prstGeom prst="rect">
+            <a:avLst/>
+          </a:prstGeom>
+          <a:noFill/>
+          <a:extLst>
+            <a:ext uri="{909E8E84-426E-40DD-AFC4-6F175D3DCCD1}">
+              <a14:hiddenFill xmlns:a14="http://schemas.microsoft.com/office/drawing/2010/main">
+                <a:solidFill>
+                  <a:srgbClr val="FFFFFF"/>
+                </a:solidFill>
+              </a14:hiddenFill>
+            </a:ext>
+          </a:extLst>
+        </p:spPr>
+      </p:pic>
+      <p:pic>
+        <p:nvPicPr>
+          <p:cNvPr id="1030" name="Picture 6" descr="Steam SVG Vector Logos - Vector Logo Zone">
+            <a:extLst>
+              <a:ext uri="{FF2B5EF4-FFF2-40B4-BE49-F238E27FC236}">
+                <a16:creationId xmlns:a16="http://schemas.microsoft.com/office/drawing/2014/main" id="{603C79B6-FB7B-A0E0-DFBA-C7B17ECCB8C9}"/>
+              </a:ext>
+            </a:extLst>
+          </p:cNvPr>
+          <p:cNvPicPr>
+            <a:picLocks noChangeAspect="1" noChangeArrowheads="1"/>
+          </p:cNvPicPr>
+          <p:nvPr/>
+        </p:nvPicPr>
+        <p:blipFill>
+          <a:blip r:embed="rId6">
+            <a:extLst>
+              <a:ext uri="{28A0092B-C50C-407E-A947-70E740481C1C}">
+                <a14:useLocalDpi xmlns:a14="http://schemas.microsoft.com/office/drawing/2010/main" val="0"/>
+              </a:ext>
+            </a:extLst>
+          </a:blip>
+          <a:srcRect/>
+          <a:stretch>
+            <a:fillRect/>
+          </a:stretch>
+        </p:blipFill>
+        <p:spPr bwMode="auto">
+          <a:xfrm>
+            <a:off x="6570586" y="1095869"/>
+            <a:ext cx="1967239" cy="983620"/>
+          </a:xfrm>
+          <a:prstGeom prst="rect">
+            <a:avLst/>
+          </a:prstGeom>
+          <a:noFill/>
+          <a:extLst>
+            <a:ext uri="{909E8E84-426E-40DD-AFC4-6F175D3DCCD1}">
+              <a14:hiddenFill xmlns:a14="http://schemas.microsoft.com/office/drawing/2010/main">
+                <a:solidFill>
+                  <a:srgbClr val="FFFFFF"/>
+                </a:solidFill>
+              </a14:hiddenFill>
+            </a:ext>
+          </a:extLst>
+        </p:spPr>
+      </p:pic>
     </p:spTree>
     <p:extLst>
       <p:ext uri="{BB962C8B-B14F-4D97-AF65-F5344CB8AC3E}">
@@ -4384,10 +5169,10 @@
       </p:sp>
       <p:pic>
         <p:nvPicPr>
-          <p:cNvPr id="10" name="Immagine 9" descr="Immagine che contiene schermata, testo, diagramma, Carattere&#10;&#10;Descrizione generata automaticamente">
+          <p:cNvPr id="4" name="Immagine 3" descr="Immagine che contiene schermata, testo, Carattere, diagramma&#10;&#10;Descrizione generata automaticamente">
             <a:extLst>
               <a:ext uri="{FF2B5EF4-FFF2-40B4-BE49-F238E27FC236}">
-                <a16:creationId xmlns:a16="http://schemas.microsoft.com/office/drawing/2014/main" id="{83334F44-CA9C-2ADD-63C2-E69D7E360544}"/>
+                <a16:creationId xmlns:a16="http://schemas.microsoft.com/office/drawing/2014/main" id="{321A2D65-89FF-3F48-5BD1-689964DB32DD}"/>
               </a:ext>
             </a:extLst>
           </p:cNvPr>
@@ -4397,15 +5182,15 @@
           <p:nvPr/>
         </p:nvPicPr>
         <p:blipFill>
-          <a:blip r:embed="rId2"/>
+          <a:blip r:embed="rId3"/>
           <a:stretch>
             <a:fillRect/>
           </a:stretch>
         </p:blipFill>
         <p:spPr>
           <a:xfrm>
-            <a:off x="1323975" y="1105021"/>
-            <a:ext cx="6496050" cy="4791075"/>
+            <a:off x="1267587" y="1033462"/>
+            <a:ext cx="6861429" cy="5067986"/>
           </a:xfrm>
           <a:prstGeom prst="rect">
             <a:avLst/>
@@ -4466,14 +5251,14 @@
           <a:lstStyle/>
           <a:p>
             <a:r>
-              <a:rPr lang="en-US"/>
+              <a:rPr lang="en-US" dirty="0"/>
               <a:t>Requirements and Entities </a:t>
             </a:r>
             <a:br>
-              <a:rPr lang="en-US"/>
+              <a:rPr lang="en-US" dirty="0"/>
             </a:br>
             <a:r>
-              <a:rPr lang="en-US"/>
+              <a:rPr lang="en-US" dirty="0"/>
               <a:t>handled by Document DB</a:t>
             </a:r>
           </a:p>
@@ -4513,19 +5298,19 @@
               </a:lnSpc>
             </a:pPr>
             <a:r>
-              <a:rPr lang="it-IT" b="1" err="1"/>
+              <a:rPr lang="it-IT" b="1" dirty="0" err="1"/>
               <a:t>Entities</a:t>
             </a:r>
             <a:r>
-              <a:rPr lang="it-IT" b="1"/>
+              <a:rPr lang="it-IT" b="1" dirty="0"/>
               <a:t> </a:t>
             </a:r>
             <a:r>
-              <a:rPr lang="it-IT" b="1" err="1"/>
+              <a:rPr lang="it-IT" b="1" dirty="0" err="1"/>
               <a:t>involved</a:t>
             </a:r>
             <a:r>
-              <a:rPr lang="it-IT" b="1"/>
+              <a:rPr lang="it-IT" b="1" dirty="0"/>
               <a:t>:</a:t>
             </a:r>
           </a:p>
@@ -4535,7 +5320,7 @@
               <a:buChar char="•"/>
             </a:pPr>
             <a:r>
-              <a:rPr lang="en-US"/>
+              <a:rPr lang="en-US" dirty="0"/>
               <a:t>User</a:t>
             </a:r>
           </a:p>
@@ -4545,7 +5330,7 @@
               <a:buChar char="•"/>
             </a:pPr>
             <a:r>
-              <a:rPr lang="en-US"/>
+              <a:rPr lang="en-US" dirty="0"/>
               <a:t>Game</a:t>
             </a:r>
           </a:p>
@@ -4555,7 +5340,7 @@
               <a:buChar char="•"/>
             </a:pPr>
             <a:r>
-              <a:rPr lang="en-US"/>
+              <a:rPr lang="en-US" dirty="0"/>
               <a:t>Review</a:t>
             </a:r>
           </a:p>
@@ -4565,7 +5350,7 @@
               <a:buChar char="•"/>
             </a:pPr>
             <a:r>
-              <a:rPr lang="en-US"/>
+              <a:rPr lang="en-US" dirty="0"/>
               <a:t>Library</a:t>
             </a:r>
           </a:p>
@@ -4575,7 +5360,7 @@
               <a:buChar char="•"/>
             </a:pPr>
             <a:r>
-              <a:rPr lang="en-US"/>
+              <a:rPr lang="en-US" dirty="0"/>
               <a:t>Wishlist</a:t>
             </a:r>
           </a:p>
@@ -4585,8 +5370,8 @@
               <a:buChar char="•"/>
             </a:pPr>
             <a:r>
-              <a:rPr lang="en-US"/>
-              <a:t>Platform</a:t>
+              <a:rPr lang="en-US" dirty="0"/>
+              <a:t>Genre</a:t>
             </a:r>
           </a:p>
           <a:p>
@@ -4595,10 +5380,10 @@
               <a:buChar char="•"/>
             </a:pPr>
             <a:r>
-              <a:rPr lang="en-US"/>
+              <a:rPr lang="en-US" dirty="0"/>
               <a:t>Company</a:t>
             </a:r>
-            <a:endParaRPr lang="it-IT"/>
+            <a:endParaRPr lang="it-IT" dirty="0"/>
           </a:p>
         </p:txBody>
       </p:sp>
@@ -4617,7 +5402,7 @@
         <p:spPr>
           <a:xfrm>
             <a:off x="2343713" y="1640711"/>
-            <a:ext cx="6600825" cy="3793603"/>
+            <a:ext cx="6600825" cy="4204356"/>
           </a:xfrm>
           <a:prstGeom prst="rect">
             <a:avLst/>
@@ -4636,11 +5421,11 @@
               </a:lnSpc>
             </a:pPr>
             <a:r>
-              <a:rPr lang="en-US" b="1"/>
+              <a:rPr lang="en-US" b="1" dirty="0"/>
               <a:t>Main requirements</a:t>
             </a:r>
             <a:r>
-              <a:rPr lang="it-IT" b="1"/>
+              <a:rPr lang="it-IT" b="1" dirty="0"/>
               <a:t>:</a:t>
             </a:r>
           </a:p>
@@ -4653,13 +5438,13 @@
               <a:buChar char="•"/>
             </a:pPr>
             <a:r>
-              <a:rPr lang="en-US" sz="1600"/>
+              <a:rPr lang="en-US" dirty="0"/>
               <a:t>Seeing the most added in library games during the current year for each specific platform in order to display them into the "Highlighted" section of the application</a:t>
             </a:r>
             <a:br>
-              <a:rPr lang="en-US" sz="1600"/>
+              <a:rPr lang="en-US" dirty="0"/>
             </a:br>
-            <a:endParaRPr lang="en-US" sz="1600"/>
+            <a:endParaRPr lang="en-US" dirty="0"/>
           </a:p>
           <a:p>
             <a:pPr marL="285750" indent="-285750">
@@ -4670,17 +5455,17 @@
               <a:buChar char="•"/>
             </a:pPr>
             <a:r>
-              <a:rPr lang="en-US" sz="1600"/>
+              <a:rPr lang="en-US" dirty="0"/>
               <a:t>Show the "Not recommended" reviews for the games you have put into the </a:t>
             </a:r>
             <a:r>
-              <a:rPr lang="en-US" sz="1600" err="1"/>
+              <a:rPr lang="en-US" dirty="0" err="1"/>
               <a:t>wishlist</a:t>
             </a:r>
             <a:br>
-              <a:rPr lang="en-US" sz="1600"/>
+              <a:rPr lang="en-US" dirty="0"/>
             </a:br>
-            <a:endParaRPr lang="en-US" sz="1600"/>
+            <a:endParaRPr lang="en-US" dirty="0"/>
           </a:p>
           <a:p>
             <a:pPr marL="285750" indent="-285750">
@@ -4691,10 +5476,10 @@
               <a:buChar char="•"/>
             </a:pPr>
             <a:r>
-              <a:rPr lang="en-US" sz="1600"/>
+              <a:rPr lang="en-US" dirty="0"/>
               <a:t>The user can view the percentage distribution of games played, grouped by genre selecting a time period.</a:t>
             </a:r>
-            <a:endParaRPr lang="it-IT" sz="1600"/>
+            <a:endParaRPr lang="it-IT" dirty="0"/>
           </a:p>
         </p:txBody>
       </p:sp>
@@ -4806,7 +5591,7 @@
           <a:p>
             <a:pPr algn="ctr"/>
             <a:r>
-              <a:rPr lang="it-IT"/>
+              <a:rPr lang="it-IT" dirty="0"/>
               <a:t>User</a:t>
             </a:r>
           </a:p>
@@ -4872,7 +5657,7 @@
         </p:nvSpPr>
         <p:spPr>
           <a:xfrm>
-            <a:off x="4674037" y="1702308"/>
+            <a:off x="5691430" y="1432475"/>
             <a:ext cx="1161288" cy="768096"/>
           </a:xfrm>
           <a:prstGeom prst="ellipse">
@@ -4899,7 +5684,7 @@
           <a:p>
             <a:pPr algn="ctr"/>
             <a:r>
-              <a:rPr lang="it-IT"/>
+              <a:rPr lang="it-IT" dirty="0"/>
               <a:t>Game</a:t>
             </a:r>
           </a:p>
@@ -4916,15 +5701,15 @@
           </p:cNvPr>
           <p:cNvCxnSpPr>
             <a:cxnSpLocks/>
-            <a:stCxn id="4" idx="6"/>
+            <a:stCxn id="4" idx="7"/>
             <a:endCxn id="19" idx="2"/>
           </p:cNvCxnSpPr>
           <p:nvPr/>
         </p:nvCxnSpPr>
         <p:spPr>
           <a:xfrm>
-            <a:off x="2089202" y="2086356"/>
-            <a:ext cx="2584835" cy="0"/>
+            <a:off x="1947257" y="1814793"/>
+            <a:ext cx="3744173" cy="1730"/>
           </a:xfrm>
           <a:prstGeom prst="straightConnector1">
             <a:avLst/>
@@ -4962,7 +5747,7 @@
         </p:nvSpPr>
         <p:spPr>
           <a:xfrm>
-            <a:off x="2403942" y="1702308"/>
+            <a:off x="2925556" y="1475058"/>
             <a:ext cx="1929520" cy="369332"/>
           </a:xfrm>
           <a:prstGeom prst="rect">
@@ -4977,7 +5762,7 @@
           <a:lstStyle/>
           <a:p>
             <a:r>
-              <a:rPr lang="it-IT"/>
+              <a:rPr lang="it-IT" dirty="0"/>
               <a:t>:ADD_TO_LIBRARY</a:t>
             </a:r>
           </a:p>
@@ -5032,8 +5817,8 @@
         </p:nvSpPr>
         <p:spPr>
           <a:xfrm>
-            <a:off x="266700" y="3323667"/>
-            <a:ext cx="8610600" cy="2680862"/>
+            <a:off x="266700" y="3403783"/>
+            <a:ext cx="8610600" cy="2819362"/>
           </a:xfrm>
           <a:prstGeom prst="rect">
             <a:avLst/>
@@ -5047,24 +5832,21 @@
           <a:lstStyle/>
           <a:p>
             <a:r>
-              <a:rPr lang="it-IT" b="1" err="1"/>
+              <a:rPr lang="it-IT" b="1" dirty="0" err="1"/>
               <a:t>Main</a:t>
             </a:r>
             <a:r>
-              <a:rPr lang="it-IT" b="1"/>
+              <a:rPr lang="it-IT" b="1" dirty="0"/>
               <a:t> </a:t>
             </a:r>
             <a:r>
-              <a:rPr lang="it-IT" b="1" err="1"/>
+              <a:rPr lang="it-IT" b="1" dirty="0" err="1"/>
               <a:t>requirements</a:t>
             </a:r>
             <a:r>
-              <a:rPr lang="it-IT" b="1"/>
+              <a:rPr lang="it-IT" b="1" dirty="0"/>
               <a:t>:</a:t>
             </a:r>
-          </a:p>
-          <a:p>
-            <a:endParaRPr lang="it-IT"/>
           </a:p>
           <a:p>
             <a:pPr marL="285750" indent="-285750">
@@ -5075,10 +5857,10 @@
               <a:buChar char="•"/>
             </a:pPr>
             <a:r>
-              <a:rPr lang="en-US"/>
+              <a:rPr lang="en-US" dirty="0"/>
               <a:t>A registered user is suggested with the people he/she might know</a:t>
             </a:r>
-            <a:endParaRPr lang="it-IT"/>
+            <a:endParaRPr lang="it-IT" dirty="0"/>
           </a:p>
           <a:p>
             <a:pPr marL="285750" indent="-285750">
@@ -5089,8 +5871,8 @@
               <a:buChar char="•"/>
             </a:pPr>
             <a:r>
-              <a:rPr lang="en-US"/>
-              <a:t>A registered user is suggested with the added to library by his/her friends (more popular games first)</a:t>
+              <a:rPr lang="en-US" dirty="0"/>
+              <a:t>A registered user is suggested with the games that his/her friends liked (more popular games first)</a:t>
             </a:r>
           </a:p>
           <a:p>
@@ -5102,8 +5884,21 @@
               <a:buChar char="•"/>
             </a:pPr>
             <a:r>
-              <a:rPr lang="en-US"/>
+              <a:rPr lang="en-US" dirty="0"/>
               <a:t>Rank the user according to the number of connections with other user and with the number of games they added.</a:t>
+            </a:r>
+          </a:p>
+          <a:p>
+            <a:pPr marL="285750" indent="-285750">
+              <a:lnSpc>
+                <a:spcPct val="150000"/>
+              </a:lnSpc>
+              <a:buFont typeface="Arial" panose="020B0604020202020204" pitchFamily="34" charset="0"/>
+              <a:buChar char="•"/>
+            </a:pPr>
+            <a:r>
+              <a:rPr lang="en-US" dirty="0"/>
+              <a:t>Suggest the most useful reviews based on the number of likes</a:t>
             </a:r>
           </a:p>
         </p:txBody>
@@ -5122,8 +5917,8 @@
         </p:nvSpPr>
         <p:spPr>
           <a:xfrm>
-            <a:off x="6576060" y="1379220"/>
-            <a:ext cx="2301240" cy="1676741"/>
+            <a:off x="7287260" y="1324285"/>
+            <a:ext cx="2301240" cy="1849865"/>
           </a:xfrm>
           <a:prstGeom prst="rect">
             <a:avLst/>
@@ -5142,46 +5937,261 @@
               </a:lnSpc>
             </a:pPr>
             <a:r>
-              <a:rPr lang="it-IT" b="1" err="1"/>
+              <a:rPr lang="it-IT" b="1" dirty="0" err="1"/>
               <a:t>Entities</a:t>
             </a:r>
             <a:r>
-              <a:rPr lang="it-IT" b="1"/>
+              <a:rPr lang="it-IT" b="1" dirty="0"/>
               <a:t> </a:t>
             </a:r>
             <a:r>
-              <a:rPr lang="it-IT" b="1" err="1"/>
+              <a:rPr lang="it-IT" b="1" dirty="0" err="1"/>
               <a:t>involved</a:t>
             </a:r>
             <a:r>
-              <a:rPr lang="it-IT" b="1"/>
+              <a:rPr lang="it-IT" b="1" dirty="0"/>
               <a:t>:</a:t>
             </a:r>
           </a:p>
           <a:p>
             <a:pPr marL="285750" indent="-285750">
               <a:lnSpc>
-                <a:spcPct val="200000"/>
+                <a:spcPct val="150000"/>
               </a:lnSpc>
               <a:buFont typeface="Arial" panose="020B0604020202020204" pitchFamily="34" charset="0"/>
               <a:buChar char="•"/>
             </a:pPr>
             <a:r>
-              <a:rPr lang="it-IT"/>
+              <a:rPr lang="it-IT" dirty="0"/>
               <a:t>User</a:t>
             </a:r>
           </a:p>
           <a:p>
             <a:pPr marL="285750" indent="-285750">
               <a:lnSpc>
-                <a:spcPct val="200000"/>
+                <a:spcPct val="150000"/>
               </a:lnSpc>
               <a:buFont typeface="Arial" panose="020B0604020202020204" pitchFamily="34" charset="0"/>
               <a:buChar char="•"/>
             </a:pPr>
             <a:r>
-              <a:rPr lang="it-IT"/>
+              <a:rPr lang="it-IT" dirty="0"/>
               <a:t>Game</a:t>
+            </a:r>
+          </a:p>
+          <a:p>
+            <a:pPr marL="285750" indent="-285750">
+              <a:lnSpc>
+                <a:spcPct val="150000"/>
+              </a:lnSpc>
+              <a:buFont typeface="Arial" panose="020B0604020202020204" pitchFamily="34" charset="0"/>
+              <a:buChar char="•"/>
+            </a:pPr>
+            <a:r>
+              <a:rPr lang="it-IT" dirty="0"/>
+              <a:t>Review</a:t>
+            </a:r>
+          </a:p>
+        </p:txBody>
+      </p:sp>
+      <p:sp>
+        <p:nvSpPr>
+          <p:cNvPr id="3" name="Ovale 2">
+            <a:extLst>
+              <a:ext uri="{FF2B5EF4-FFF2-40B4-BE49-F238E27FC236}">
+                <a16:creationId xmlns:a16="http://schemas.microsoft.com/office/drawing/2014/main" id="{C185A7A4-A106-1AF0-0D4D-6E057412BEF6}"/>
+              </a:ext>
+            </a:extLst>
+          </p:cNvPr>
+          <p:cNvSpPr/>
+          <p:nvPr/>
+        </p:nvSpPr>
+        <p:spPr>
+          <a:xfrm>
+            <a:off x="4918691" y="2477472"/>
+            <a:ext cx="1353383" cy="768096"/>
+          </a:xfrm>
+          <a:prstGeom prst="ellipse">
+            <a:avLst/>
+          </a:prstGeom>
+        </p:spPr>
+        <p:style>
+          <a:lnRef idx="1">
+            <a:schemeClr val="accent1"/>
+          </a:lnRef>
+          <a:fillRef idx="3">
+            <a:schemeClr val="accent1"/>
+          </a:fillRef>
+          <a:effectRef idx="2">
+            <a:schemeClr val="accent1"/>
+          </a:effectRef>
+          <a:fontRef idx="minor">
+            <a:schemeClr val="lt1"/>
+          </a:fontRef>
+        </p:style>
+        <p:txBody>
+          <a:bodyPr rtlCol="0" anchor="ctr"/>
+          <a:lstStyle/>
+          <a:p>
+            <a:pPr algn="ctr"/>
+            <a:r>
+              <a:rPr lang="it-IT" dirty="0"/>
+              <a:t>Review</a:t>
+            </a:r>
+          </a:p>
+        </p:txBody>
+      </p:sp>
+      <p:cxnSp>
+        <p:nvCxnSpPr>
+          <p:cNvPr id="7" name="Connettore 2 6">
+            <a:extLst>
+              <a:ext uri="{FF2B5EF4-FFF2-40B4-BE49-F238E27FC236}">
+                <a16:creationId xmlns:a16="http://schemas.microsoft.com/office/drawing/2014/main" id="{CB4C0B58-A65C-503F-372A-E9ABA3AED9AC}"/>
+              </a:ext>
+            </a:extLst>
+          </p:cNvPr>
+          <p:cNvCxnSpPr>
+            <a:stCxn id="4" idx="5"/>
+            <a:endCxn id="3" idx="2"/>
+          </p:cNvCxnSpPr>
+          <p:nvPr/>
+        </p:nvCxnSpPr>
+        <p:spPr>
+          <a:xfrm rot="16200000" flipH="1">
+            <a:off x="3181174" y="1124002"/>
+            <a:ext cx="503601" cy="2971434"/>
+          </a:xfrm>
+          <a:prstGeom prst="bentConnector2">
+            <a:avLst/>
+          </a:prstGeom>
+          <a:ln>
+            <a:tailEnd type="triangle"/>
+          </a:ln>
+        </p:spPr>
+        <p:style>
+          <a:lnRef idx="2">
+            <a:schemeClr val="accent1"/>
+          </a:lnRef>
+          <a:fillRef idx="0">
+            <a:schemeClr val="accent1"/>
+          </a:fillRef>
+          <a:effectRef idx="1">
+            <a:schemeClr val="accent1"/>
+          </a:effectRef>
+          <a:fontRef idx="minor">
+            <a:schemeClr val="tx1"/>
+          </a:fontRef>
+        </p:style>
+      </p:cxnSp>
+      <p:cxnSp>
+        <p:nvCxnSpPr>
+          <p:cNvPr id="9" name="Connettore 2 8">
+            <a:extLst>
+              <a:ext uri="{FF2B5EF4-FFF2-40B4-BE49-F238E27FC236}">
+                <a16:creationId xmlns:a16="http://schemas.microsoft.com/office/drawing/2014/main" id="{A5432CA8-3C55-5009-21CE-01986D618C02}"/>
+              </a:ext>
+            </a:extLst>
+          </p:cNvPr>
+          <p:cNvCxnSpPr>
+            <a:cxnSpLocks/>
+            <a:stCxn id="4" idx="6"/>
+            <a:endCxn id="3" idx="1"/>
+          </p:cNvCxnSpPr>
+          <p:nvPr/>
+        </p:nvCxnSpPr>
+        <p:spPr>
+          <a:xfrm>
+            <a:off x="2089202" y="2086356"/>
+            <a:ext cx="3027687" cy="503601"/>
+          </a:xfrm>
+          <a:prstGeom prst="bentConnector2">
+            <a:avLst/>
+          </a:prstGeom>
+          <a:ln>
+            <a:tailEnd type="triangle"/>
+          </a:ln>
+        </p:spPr>
+        <p:style>
+          <a:lnRef idx="2">
+            <a:schemeClr val="accent1"/>
+          </a:lnRef>
+          <a:fillRef idx="0">
+            <a:schemeClr val="accent1"/>
+          </a:fillRef>
+          <a:effectRef idx="1">
+            <a:schemeClr val="accent1"/>
+          </a:effectRef>
+          <a:fontRef idx="minor">
+            <a:schemeClr val="tx1"/>
+          </a:fontRef>
+        </p:style>
+      </p:cxnSp>
+      <p:sp>
+        <p:nvSpPr>
+          <p:cNvPr id="32" name="CasellaDiTesto 31">
+            <a:extLst>
+              <a:ext uri="{FF2B5EF4-FFF2-40B4-BE49-F238E27FC236}">
+                <a16:creationId xmlns:a16="http://schemas.microsoft.com/office/drawing/2014/main" id="{D053F41E-9E67-850D-93C9-0B000D3685A5}"/>
+              </a:ext>
+            </a:extLst>
+          </p:cNvPr>
+          <p:cNvSpPr txBox="1"/>
+          <p:nvPr/>
+        </p:nvSpPr>
+        <p:spPr>
+          <a:xfrm>
+            <a:off x="3131117" y="2066973"/>
+            <a:ext cx="1929520" cy="369332"/>
+          </a:xfrm>
+          <a:prstGeom prst="rect">
+            <a:avLst/>
+          </a:prstGeom>
+          <a:noFill/>
+        </p:spPr>
+        <p:txBody>
+          <a:bodyPr wrap="square" rtlCol="0">
+            <a:spAutoFit/>
+          </a:bodyPr>
+          <a:lstStyle/>
+          <a:p>
+            <a:r>
+              <a:rPr lang="it-IT" dirty="0"/>
+              <a:t>:LIKE</a:t>
+            </a:r>
+          </a:p>
+        </p:txBody>
+      </p:sp>
+      <p:sp>
+        <p:nvSpPr>
+          <p:cNvPr id="33" name="CasellaDiTesto 32">
+            <a:extLst>
+              <a:ext uri="{FF2B5EF4-FFF2-40B4-BE49-F238E27FC236}">
+                <a16:creationId xmlns:a16="http://schemas.microsoft.com/office/drawing/2014/main" id="{6FDA74BC-E433-34BF-276D-6BD16F8D13DC}"/>
+              </a:ext>
+            </a:extLst>
+          </p:cNvPr>
+          <p:cNvSpPr txBox="1"/>
+          <p:nvPr/>
+        </p:nvSpPr>
+        <p:spPr>
+          <a:xfrm>
+            <a:off x="2972895" y="2517608"/>
+            <a:ext cx="1929520" cy="369332"/>
+          </a:xfrm>
+          <a:prstGeom prst="rect">
+            <a:avLst/>
+          </a:prstGeom>
+          <a:noFill/>
+        </p:spPr>
+        <p:txBody>
+          <a:bodyPr wrap="square" rtlCol="0">
+            <a:spAutoFit/>
+          </a:bodyPr>
+          <a:lstStyle/>
+          <a:p>
+            <a:r>
+              <a:rPr lang="it-IT" dirty="0"/>
+              <a:t>:DISLIKE</a:t>
             </a:r>
           </a:p>
         </p:txBody>
@@ -5308,7 +6318,7 @@
           <p:nvPr/>
         </p:nvPicPr>
         <p:blipFill>
-          <a:blip r:embed="rId2">
+          <a:blip r:embed="rId3">
             <a:extLst>
               <a:ext uri="{28A0092B-C50C-407E-A947-70E740481C1C}">
                 <a14:useLocalDpi xmlns:a14="http://schemas.microsoft.com/office/drawing/2010/main" val="0"/>
@@ -5355,7 +6365,7 @@
           <p:nvPr/>
         </p:nvPicPr>
         <p:blipFill>
-          <a:blip r:embed="rId3">
+          <a:blip r:embed="rId4">
             <a:extLst>
               <a:ext uri="{28A0092B-C50C-407E-A947-70E740481C1C}">
                 <a14:useLocalDpi xmlns:a14="http://schemas.microsoft.com/office/drawing/2010/main" val="0"/>
@@ -5416,51 +6426,51 @@
           <a:lstStyle/>
           <a:p>
             <a:r>
-              <a:rPr lang="it-IT" b="1"/>
+              <a:rPr lang="it-IT" b="1" dirty="0"/>
               <a:t>Programming </a:t>
             </a:r>
             <a:r>
-              <a:rPr lang="it-IT" b="1" err="1"/>
+              <a:rPr lang="it-IT" b="1" dirty="0" err="1"/>
               <a:t>languages</a:t>
             </a:r>
             <a:r>
-              <a:rPr lang="it-IT"/>
+              <a:rPr lang="it-IT" dirty="0"/>
               <a:t>: </a:t>
             </a:r>
             <a:r>
-              <a:rPr lang="it-IT" b="1"/>
+              <a:rPr lang="it-IT" b="1" dirty="0"/>
               <a:t>Java w/ </a:t>
             </a:r>
             <a:r>
-              <a:rPr lang="it-IT" b="1" err="1"/>
+              <a:rPr lang="it-IT" b="1" dirty="0" err="1"/>
               <a:t>Maven</a:t>
             </a:r>
             <a:r>
-              <a:rPr lang="it-IT" b="1"/>
+              <a:rPr lang="it-IT" b="1" dirty="0"/>
               <a:t> </a:t>
             </a:r>
             <a:r>
-              <a:rPr lang="it-IT"/>
+              <a:rPr lang="it-IT" dirty="0"/>
               <a:t>for </a:t>
             </a:r>
             <a:r>
-              <a:rPr lang="it-IT" err="1"/>
+              <a:rPr lang="it-IT" dirty="0" err="1"/>
               <a:t>handling</a:t>
             </a:r>
             <a:r>
-              <a:rPr lang="it-IT"/>
+              <a:rPr lang="it-IT" dirty="0"/>
               <a:t> </a:t>
             </a:r>
             <a:r>
-              <a:rPr lang="it-IT" err="1"/>
+              <a:rPr lang="it-IT" dirty="0" err="1"/>
               <a:t>dependecies</a:t>
             </a:r>
             <a:r>
-              <a:rPr lang="it-IT"/>
+              <a:rPr lang="it-IT" dirty="0"/>
               <a:t> (</a:t>
             </a:r>
             <a:r>
-              <a:rPr lang="it-IT" sz="1800" err="1">
+              <a:rPr lang="it-IT" sz="1800" dirty="0" err="1">
                 <a:effectLst/>
                 <a:latin typeface="Calibri" panose="020F0502020204030204" pitchFamily="34" charset="0"/>
                 <a:ea typeface="SimSun" panose="02010600030101010101" pitchFamily="2" charset="-122"/>
@@ -5469,7 +6479,7 @@
               <a:t>mongodb</a:t>
             </a:r>
             <a:r>
-              <a:rPr lang="it-IT" sz="1800">
+              <a:rPr lang="it-IT" sz="1800" dirty="0">
                 <a:effectLst/>
                 <a:latin typeface="Calibri" panose="020F0502020204030204" pitchFamily="34" charset="0"/>
                 <a:ea typeface="SimSun" panose="02010600030101010101" pitchFamily="2" charset="-122"/>
@@ -5478,7 +6488,7 @@
               <a:t>-driver-</a:t>
             </a:r>
             <a:r>
-              <a:rPr lang="it-IT" sz="1800" err="1">
+              <a:rPr lang="it-IT" sz="1800" dirty="0" err="1">
                 <a:effectLst/>
                 <a:latin typeface="Calibri" panose="020F0502020204030204" pitchFamily="34" charset="0"/>
                 <a:ea typeface="SimSun" panose="02010600030101010101" pitchFamily="2" charset="-122"/>
@@ -5487,7 +6497,7 @@
               <a:t>sync</a:t>
             </a:r>
             <a:r>
-              <a:rPr lang="it-IT" sz="1800">
+              <a:rPr lang="it-IT" sz="1800" dirty="0">
                 <a:effectLst/>
                 <a:latin typeface="Calibri" panose="020F0502020204030204" pitchFamily="34" charset="0"/>
                 <a:ea typeface="SimSun" panose="02010600030101010101" pitchFamily="2" charset="-122"/>
@@ -5496,39 +6506,39 @@
               <a:t>, </a:t>
             </a:r>
             <a:r>
-              <a:rPr lang="it-IT"/>
+              <a:rPr lang="it-IT" dirty="0"/>
               <a:t>neo4j-java-driver) and Python for Web </a:t>
             </a:r>
             <a:r>
-              <a:rPr lang="it-IT" err="1"/>
+              <a:rPr lang="it-IT" dirty="0" err="1"/>
               <a:t>Scraping</a:t>
             </a:r>
             <a:r>
-              <a:rPr lang="it-IT"/>
+              <a:rPr lang="it-IT" dirty="0"/>
               <a:t> part (</a:t>
             </a:r>
             <a:r>
-              <a:rPr lang="it-IT" err="1"/>
+              <a:rPr lang="it-IT" dirty="0" err="1"/>
               <a:t>requests</a:t>
             </a:r>
             <a:r>
-              <a:rPr lang="it-IT"/>
+              <a:rPr lang="it-IT" dirty="0"/>
               <a:t> &amp; </a:t>
             </a:r>
             <a:r>
-              <a:rPr lang="it-IT" err="1"/>
+              <a:rPr lang="it-IT" dirty="0" err="1"/>
               <a:t>Beautifoul</a:t>
             </a:r>
             <a:r>
-              <a:rPr lang="it-IT"/>
+              <a:rPr lang="it-IT" dirty="0"/>
               <a:t> </a:t>
             </a:r>
             <a:r>
-              <a:rPr lang="it-IT" err="1"/>
+              <a:rPr lang="it-IT" dirty="0" err="1"/>
               <a:t>Soup</a:t>
             </a:r>
             <a:r>
-              <a:rPr lang="it-IT"/>
+              <a:rPr lang="it-IT" dirty="0"/>
               <a:t> 4).</a:t>
             </a:r>
           </a:p>
@@ -5592,7 +6602,7 @@
           <p:nvPr/>
         </p:nvPicPr>
         <p:blipFill>
-          <a:blip r:embed="rId4">
+          <a:blip r:embed="rId5">
             <a:extLst>
               <a:ext uri="{28A0092B-C50C-407E-A947-70E740481C1C}">
                 <a14:useLocalDpi xmlns:a14="http://schemas.microsoft.com/office/drawing/2010/main" val="0"/>

</xml_diff>

<commit_message>
Modified slide n.2 avoiding repetition on reviews
</commit_message>
<xml_diff>
--- a/Preliminary Presentation.pptx
+++ b/Preliminary Presentation.pptx
@@ -136,8 +136,7 @@
 <file path=ppt/revisionInfo.xml><?xml version="1.0" encoding="utf-8"?>
 <p1510:revInfo xmlns:a="http://schemas.openxmlformats.org/drawingml/2006/main" xmlns:r="http://schemas.openxmlformats.org/officeDocument/2006/relationships" xmlns:p1510="http://schemas.microsoft.com/office/powerpoint/2015/10/main">
   <p1510:revLst>
-    <p1510:client id="{7E813D99-AEB3-4B76-BDCC-DFF4C8F531E4}" v="1266" dt="2023-12-11T19:23:04.798"/>
-    <p1510:client id="{FBB22E37-8680-F705-B5D6-B35A14BA1DB5}" v="99" dt="2023-12-11T19:36:15.951"/>
+    <p1510:client id="{7E813D99-AEB3-4B76-BDCC-DFF4C8F531E4}" v="1267" dt="2023-12-11T20:30:02.386"/>
   </p1510:revLst>
 </p1510:revInfo>
 </file>
@@ -224,7 +223,7 @@
           <a:p>
             <a:fld id="{0EF95162-6873-F647-B392-BF6A1F606277}" type="datetimeFigureOut">
               <a:rPr lang="it-IT" smtClean="0"/>
-              <a:t>11/12/2023</a:t>
+              <a:t>12/12/2023</a:t>
             </a:fld>
             <a:endParaRPr lang="it-IT"/>
           </a:p>
@@ -382,7 +381,7 @@
           <a:p>
             <a:fld id="{60FDF8BA-B6A2-CC4D-B552-37BF044E1040}" type="slidenum">
               <a:rPr lang="it-IT" smtClean="0"/>
-              <a:t>‹#›</a:t>
+              <a:t>‹N›</a:t>
             </a:fld>
             <a:endParaRPr lang="it-IT"/>
           </a:p>
@@ -1287,7 +1286,7 @@
           <a:p>
             <a:fld id="{2FDCBEE4-315A-8E42-835E-29A1DAE07625}" type="datetimeFigureOut">
               <a:rPr lang="it-IT" smtClean="0"/>
-              <a:t>11/12/2023</a:t>
+              <a:t>12/12/2023</a:t>
             </a:fld>
             <a:endParaRPr lang="it-IT"/>
           </a:p>
@@ -1345,7 +1344,7 @@
           <a:p>
             <a:fld id="{F3EAF9BD-73C2-C944-967F-16A9AD6CE362}" type="slidenum">
               <a:rPr lang="it-IT" smtClean="0"/>
-              <a:t>‹#›</a:t>
+              <a:t>‹N›</a:t>
             </a:fld>
             <a:endParaRPr lang="it-IT"/>
           </a:p>
@@ -1479,7 +1478,7 @@
           <a:p>
             <a:fld id="{2FDCBEE4-315A-8E42-835E-29A1DAE07625}" type="datetimeFigureOut">
               <a:rPr lang="it-IT" smtClean="0"/>
-              <a:t>11/12/2023</a:t>
+              <a:t>12/12/2023</a:t>
             </a:fld>
             <a:endParaRPr lang="it-IT"/>
           </a:p>
@@ -1537,7 +1536,7 @@
           <a:p>
             <a:fld id="{F3EAF9BD-73C2-C944-967F-16A9AD6CE362}" type="slidenum">
               <a:rPr lang="it-IT" smtClean="0"/>
-              <a:t>‹#›</a:t>
+              <a:t>‹N›</a:t>
             </a:fld>
             <a:endParaRPr lang="it-IT"/>
           </a:p>
@@ -1681,7 +1680,7 @@
           <a:p>
             <a:fld id="{2FDCBEE4-315A-8E42-835E-29A1DAE07625}" type="datetimeFigureOut">
               <a:rPr lang="it-IT" smtClean="0"/>
-              <a:t>11/12/2023</a:t>
+              <a:t>12/12/2023</a:t>
             </a:fld>
             <a:endParaRPr lang="it-IT"/>
           </a:p>
@@ -1739,7 +1738,7 @@
           <a:p>
             <a:fld id="{F3EAF9BD-73C2-C944-967F-16A9AD6CE362}" type="slidenum">
               <a:rPr lang="it-IT" smtClean="0"/>
-              <a:t>‹#›</a:t>
+              <a:t>‹N›</a:t>
             </a:fld>
             <a:endParaRPr lang="it-IT"/>
           </a:p>
@@ -1873,7 +1872,7 @@
           <a:p>
             <a:fld id="{2FDCBEE4-315A-8E42-835E-29A1DAE07625}" type="datetimeFigureOut">
               <a:rPr lang="it-IT" smtClean="0"/>
-              <a:t>11/12/2023</a:t>
+              <a:t>12/12/2023</a:t>
             </a:fld>
             <a:endParaRPr lang="it-IT"/>
           </a:p>
@@ -1931,7 +1930,7 @@
           <a:p>
             <a:fld id="{F3EAF9BD-73C2-C944-967F-16A9AD6CE362}" type="slidenum">
               <a:rPr lang="it-IT" smtClean="0"/>
-              <a:t>‹#›</a:t>
+              <a:t>‹N›</a:t>
             </a:fld>
             <a:endParaRPr lang="it-IT"/>
           </a:p>
@@ -2142,7 +2141,7 @@
           <a:p>
             <a:fld id="{2FDCBEE4-315A-8E42-835E-29A1DAE07625}" type="datetimeFigureOut">
               <a:rPr lang="it-IT" smtClean="0"/>
-              <a:t>11/12/2023</a:t>
+              <a:t>12/12/2023</a:t>
             </a:fld>
             <a:endParaRPr lang="it-IT"/>
           </a:p>
@@ -2200,7 +2199,7 @@
           <a:p>
             <a:fld id="{F3EAF9BD-73C2-C944-967F-16A9AD6CE362}" type="slidenum">
               <a:rPr lang="it-IT" smtClean="0"/>
-              <a:t>‹#›</a:t>
+              <a:t>‹N›</a:t>
             </a:fld>
             <a:endParaRPr lang="it-IT"/>
           </a:p>
@@ -2451,7 +2450,7 @@
           <a:p>
             <a:fld id="{2FDCBEE4-315A-8E42-835E-29A1DAE07625}" type="datetimeFigureOut">
               <a:rPr lang="it-IT" smtClean="0"/>
-              <a:t>11/12/2023</a:t>
+              <a:t>12/12/2023</a:t>
             </a:fld>
             <a:endParaRPr lang="it-IT"/>
           </a:p>
@@ -2509,7 +2508,7 @@
           <a:p>
             <a:fld id="{F3EAF9BD-73C2-C944-967F-16A9AD6CE362}" type="slidenum">
               <a:rPr lang="it-IT" smtClean="0"/>
-              <a:t>‹#›</a:t>
+              <a:t>‹N›</a:t>
             </a:fld>
             <a:endParaRPr lang="it-IT"/>
           </a:p>
@@ -2894,7 +2893,7 @@
           <a:p>
             <a:fld id="{2FDCBEE4-315A-8E42-835E-29A1DAE07625}" type="datetimeFigureOut">
               <a:rPr lang="it-IT" smtClean="0"/>
-              <a:t>11/12/2023</a:t>
+              <a:t>12/12/2023</a:t>
             </a:fld>
             <a:endParaRPr lang="it-IT"/>
           </a:p>
@@ -2952,7 +2951,7 @@
           <a:p>
             <a:fld id="{F3EAF9BD-73C2-C944-967F-16A9AD6CE362}" type="slidenum">
               <a:rPr lang="it-IT" smtClean="0"/>
-              <a:t>‹#›</a:t>
+              <a:t>‹N›</a:t>
             </a:fld>
             <a:endParaRPr lang="it-IT"/>
           </a:p>
@@ -3035,7 +3034,7 @@
           <a:p>
             <a:fld id="{2FDCBEE4-315A-8E42-835E-29A1DAE07625}" type="datetimeFigureOut">
               <a:rPr lang="it-IT" smtClean="0"/>
-              <a:t>11/12/2023</a:t>
+              <a:t>12/12/2023</a:t>
             </a:fld>
             <a:endParaRPr lang="it-IT"/>
           </a:p>
@@ -3093,7 +3092,7 @@
           <a:p>
             <a:fld id="{F3EAF9BD-73C2-C944-967F-16A9AD6CE362}" type="slidenum">
               <a:rPr lang="it-IT" smtClean="0"/>
-              <a:t>‹#›</a:t>
+              <a:t>‹N›</a:t>
             </a:fld>
             <a:endParaRPr lang="it-IT"/>
           </a:p>
@@ -3154,7 +3153,7 @@
           <a:p>
             <a:fld id="{2FDCBEE4-315A-8E42-835E-29A1DAE07625}" type="datetimeFigureOut">
               <a:rPr lang="it-IT" smtClean="0"/>
-              <a:t>11/12/2023</a:t>
+              <a:t>12/12/2023</a:t>
             </a:fld>
             <a:endParaRPr lang="it-IT"/>
           </a:p>
@@ -3212,7 +3211,7 @@
           <a:p>
             <a:fld id="{F3EAF9BD-73C2-C944-967F-16A9AD6CE362}" type="slidenum">
               <a:rPr lang="it-IT" smtClean="0"/>
-              <a:t>‹#›</a:t>
+              <a:t>‹N›</a:t>
             </a:fld>
             <a:endParaRPr lang="it-IT"/>
           </a:p>
@@ -3453,7 +3452,7 @@
           <a:p>
             <a:fld id="{2FDCBEE4-315A-8E42-835E-29A1DAE07625}" type="datetimeFigureOut">
               <a:rPr lang="it-IT" smtClean="0"/>
-              <a:t>11/12/2023</a:t>
+              <a:t>12/12/2023</a:t>
             </a:fld>
             <a:endParaRPr lang="it-IT"/>
           </a:p>
@@ -3511,7 +3510,7 @@
           <a:p>
             <a:fld id="{F3EAF9BD-73C2-C944-967F-16A9AD6CE362}" type="slidenum">
               <a:rPr lang="it-IT" smtClean="0"/>
-              <a:t>‹#›</a:t>
+              <a:t>‹N›</a:t>
             </a:fld>
             <a:endParaRPr lang="it-IT"/>
           </a:p>
@@ -3729,7 +3728,7 @@
           <a:p>
             <a:fld id="{2FDCBEE4-315A-8E42-835E-29A1DAE07625}" type="datetimeFigureOut">
               <a:rPr lang="it-IT" smtClean="0"/>
-              <a:t>11/12/2023</a:t>
+              <a:t>12/12/2023</a:t>
             </a:fld>
             <a:endParaRPr lang="it-IT"/>
           </a:p>
@@ -3787,7 +3786,7 @@
           <a:p>
             <a:fld id="{F3EAF9BD-73C2-C944-967F-16A9AD6CE362}" type="slidenum">
               <a:rPr lang="it-IT" smtClean="0"/>
-              <a:t>‹#›</a:t>
+              <a:t>‹N›</a:t>
             </a:fld>
             <a:endParaRPr lang="it-IT"/>
           </a:p>
@@ -4684,7 +4683,7 @@
             </a:pPr>
             <a:r>
               <a:rPr lang="en-US" dirty="0"/>
-              <a:t>Connect with other players, share rating and reviews and follow their activities</a:t>
+              <a:t>Connect with other players following their activities</a:t>
             </a:r>
           </a:p>
           <a:p>
@@ -4764,10 +4763,10 @@
       </p:sp>
       <p:pic>
         <p:nvPicPr>
-          <p:cNvPr id="4" name="Immagine 3" descr="Immagine che contiene schermata, testo, cerchio, design&#10;&#10;Descrizione generata automaticamente">
+          <p:cNvPr id="5" name="Immagine 4" descr="Immagine che contiene testo, schermata, cerchio, design&#10;&#10;Descrizione generata automaticamente">
             <a:extLst>
               <a:ext uri="{FF2B5EF4-FFF2-40B4-BE49-F238E27FC236}">
-                <a16:creationId xmlns:a16="http://schemas.microsoft.com/office/drawing/2014/main" id="{E19646BC-9FBF-809B-F7D1-FF8A7DCEAD96}"/>
+                <a16:creationId xmlns:a16="http://schemas.microsoft.com/office/drawing/2014/main" id="{077F7090-2795-195B-DC90-E2DEA5CF189C}"/>
               </a:ext>
             </a:extLst>
           </p:cNvPr>
@@ -4784,8 +4783,8 @@
         </p:blipFill>
         <p:spPr>
           <a:xfrm>
-            <a:off x="864319" y="1233093"/>
-            <a:ext cx="7200689" cy="4870176"/>
+            <a:off x="928687" y="1323975"/>
+            <a:ext cx="7286625" cy="4739268"/>
           </a:xfrm>
           <a:prstGeom prst="rect">
             <a:avLst/>

</xml_diff>